<commit_message>
Added slides about ArenaDelivery artifacts.
</commit_message>
<xml_diff>
--- a/presentation/InstallationCourse.pptx
+++ b/presentation/InstallationCourse.pptx
@@ -59,24 +59,30 @@
     <p:sldId id="305" r:id="rId53"/>
     <p:sldId id="332" r:id="rId54"/>
     <p:sldId id="328" r:id="rId55"/>
-    <p:sldId id="330" r:id="rId56"/>
+    <p:sldId id="278" r:id="rId56"/>
     <p:sldId id="331" r:id="rId57"/>
-    <p:sldId id="278" r:id="rId58"/>
-    <p:sldId id="293" r:id="rId59"/>
-    <p:sldId id="294" r:id="rId60"/>
-    <p:sldId id="295" r:id="rId61"/>
-    <p:sldId id="326" r:id="rId62"/>
-    <p:sldId id="296" r:id="rId63"/>
-    <p:sldId id="297" r:id="rId64"/>
-    <p:sldId id="298" r:id="rId65"/>
-    <p:sldId id="299" r:id="rId66"/>
-    <p:sldId id="306" r:id="rId67"/>
-    <p:sldId id="309" r:id="rId68"/>
-    <p:sldId id="300" r:id="rId69"/>
-    <p:sldId id="308" r:id="rId70"/>
-    <p:sldId id="310" r:id="rId71"/>
-    <p:sldId id="311" r:id="rId72"/>
-    <p:sldId id="312" r:id="rId73"/>
+    <p:sldId id="293" r:id="rId58"/>
+    <p:sldId id="330" r:id="rId59"/>
+    <p:sldId id="333" r:id="rId60"/>
+    <p:sldId id="334" r:id="rId61"/>
+    <p:sldId id="335" r:id="rId62"/>
+    <p:sldId id="336" r:id="rId63"/>
+    <p:sldId id="338" r:id="rId64"/>
+    <p:sldId id="337" r:id="rId65"/>
+    <p:sldId id="294" r:id="rId66"/>
+    <p:sldId id="295" r:id="rId67"/>
+    <p:sldId id="326" r:id="rId68"/>
+    <p:sldId id="296" r:id="rId69"/>
+    <p:sldId id="297" r:id="rId70"/>
+    <p:sldId id="298" r:id="rId71"/>
+    <p:sldId id="299" r:id="rId72"/>
+    <p:sldId id="306" r:id="rId73"/>
+    <p:sldId id="309" r:id="rId74"/>
+    <p:sldId id="300" r:id="rId75"/>
+    <p:sldId id="308" r:id="rId76"/>
+    <p:sldId id="310" r:id="rId77"/>
+    <p:sldId id="311" r:id="rId78"/>
+    <p:sldId id="312" r:id="rId79"/>
   </p:sldIdLst>
   <p:sldSz cx="12192000" cy="6858000"/>
   <p:notesSz cx="6858000" cy="9144000"/>
@@ -16925,7 +16931,7 @@
       </p:grpSpPr>
       <p:sp>
         <p:nvSpPr>
-          <p:cNvPr id="4" name="Content Placeholder 3"/>
+          <p:cNvPr id="3" name="Content Placeholder 2"/>
           <p:cNvSpPr>
             <a:spLocks noGrp="1"/>
           </p:cNvSpPr>
@@ -16940,15 +16946,33 @@
           <a:p>
             <a:r>
               <a:rPr lang="nb-NO" dirty="0" smtClean="0"/>
-              <a:t>TODO: Screenshot av modul</a:t>
-            </a:r>
-            <a:endParaRPr lang="nb-NO" dirty="0"/>
-          </a:p>
-        </p:txBody>
-      </p:sp>
-      <p:sp>
-        <p:nvSpPr>
-          <p:cNvPr id="3" name="Title 2"/>
+              <a:t>A collection of </a:t>
+            </a:r>
+            <a:r>
+              <a:rPr lang="nb-NO" dirty="0"/>
+              <a:t>C</a:t>
+            </a:r>
+            <a:r>
+              <a:rPr lang="nb-NO" dirty="0" smtClean="0"/>
+              <a:t>hocolatey packages for an Arena Client, Server, etc. </a:t>
+            </a:r>
+            <a:r>
+              <a:rPr lang="nb-NO" dirty="0" err="1" smtClean="0"/>
+              <a:t>installation</a:t>
+            </a:r>
+            <a:endParaRPr lang="nb-NO" dirty="0" smtClean="0"/>
+          </a:p>
+          <a:p>
+            <a:r>
+              <a:rPr lang="nb-NO" dirty="0" smtClean="0"/>
+              <a:t>Zip archive containing Chocolatey packages (offline source), parameter files, and setup scripts to ease the installation</a:t>
+            </a:r>
+          </a:p>
+        </p:txBody>
+      </p:sp>
+      <p:sp>
+        <p:nvSpPr>
+          <p:cNvPr id="2" name="Title 1"/>
           <p:cNvSpPr>
             <a:spLocks noGrp="1"/>
           </p:cNvSpPr>
@@ -16963,7 +16987,7 @@
           <a:p>
             <a:r>
               <a:rPr lang="nb-NO" dirty="0" smtClean="0"/>
-              <a:t>Templates module</a:t>
+              <a:t>DIPS Delivery Packages</a:t>
             </a:r>
             <a:endParaRPr lang="nb-NO" dirty="0"/>
           </a:p>
@@ -16972,7 +16996,7 @@
     </p:spTree>
     <p:extLst>
       <p:ext uri="{BB962C8B-B14F-4D97-AF65-F5344CB8AC3E}">
-        <p14:creationId xmlns:p14="http://schemas.microsoft.com/office/powerpoint/2010/main" val="988075650"/>
+        <p14:creationId xmlns:p14="http://schemas.microsoft.com/office/powerpoint/2010/main" val="1891317082"/>
       </p:ext>
     </p:extLst>
   </p:cSld>
@@ -16999,14 +17023,40 @@
           <a:chExt cx="0" cy="0"/>
         </a:xfrm>
       </p:grpSpPr>
-      <p:sp>
-        <p:nvSpPr>
-          <p:cNvPr id="2" name="Content Placeholder 1"/>
-          <p:cNvSpPr>
-            <a:spLocks noGrp="1"/>
-          </p:cNvSpPr>
+      <p:pic>
+        <p:nvPicPr>
+          <p:cNvPr id="4" name="Content Placeholder 3"/>
+          <p:cNvPicPr>
+            <a:picLocks noGrp="1" noChangeAspect="1"/>
+          </p:cNvPicPr>
           <p:nvPr>
             <p:ph idx="1"/>
+          </p:nvPr>
+        </p:nvPicPr>
+        <p:blipFill>
+          <a:blip r:embed="rId2"/>
+          <a:stretch>
+            <a:fillRect/>
+          </a:stretch>
+        </p:blipFill>
+        <p:spPr>
+          <a:xfrm>
+            <a:off x="844922" y="1899452"/>
+            <a:ext cx="3833449" cy="3652889"/>
+          </a:xfrm>
+          <a:prstGeom prst="rect">
+            <a:avLst/>
+          </a:prstGeom>
+        </p:spPr>
+      </p:pic>
+      <p:sp>
+        <p:nvSpPr>
+          <p:cNvPr id="5" name="Content Placeholder 4"/>
+          <p:cNvSpPr>
+            <a:spLocks noGrp="1"/>
+          </p:cNvSpPr>
+          <p:nvPr>
+            <p:ph idx="13"/>
           </p:nvPr>
         </p:nvSpPr>
         <p:spPr/>
@@ -17016,8 +17066,72 @@
           <a:p>
             <a:r>
               <a:rPr lang="nb-NO" dirty="0" smtClean="0"/>
-              <a:t>TODO: Screenshot av konfigurasjon</a:t>
-            </a:r>
+              <a:t>Chocolatey packages</a:t>
+            </a:r>
+          </a:p>
+          <a:p>
+            <a:pPr lvl="1"/>
+            <a:r>
+              <a:rPr lang="nb-NO" dirty="0" smtClean="0"/>
+              <a:t>Metadata</a:t>
+            </a:r>
+          </a:p>
+          <a:p>
+            <a:pPr lvl="1"/>
+            <a:r>
+              <a:rPr lang="nb-NO" dirty="0" smtClean="0"/>
+              <a:t>Actual packages</a:t>
+            </a:r>
+          </a:p>
+          <a:p>
+            <a:r>
+              <a:rPr lang="nb-NO" dirty="0" smtClean="0"/>
+              <a:t>Parameters</a:t>
+            </a:r>
+          </a:p>
+          <a:p>
+            <a:pPr lvl="1"/>
+            <a:r>
+              <a:rPr lang="nb-NO" dirty="0" smtClean="0"/>
+              <a:t>Parameter values</a:t>
+            </a:r>
+          </a:p>
+          <a:p>
+            <a:pPr lvl="1"/>
+            <a:r>
+              <a:rPr lang="nb-NO" dirty="0" smtClean="0"/>
+              <a:t>Parameter mapping</a:t>
+            </a:r>
+          </a:p>
+          <a:p>
+            <a:r>
+              <a:rPr lang="nb-NO" dirty="0" smtClean="0"/>
+              <a:t>Install scripts</a:t>
+            </a:r>
+          </a:p>
+          <a:p>
+            <a:pPr lvl="1"/>
+            <a:r>
+              <a:rPr lang="nb-NO" dirty="0" smtClean="0"/>
+              <a:t>Setup</a:t>
+            </a:r>
+          </a:p>
+          <a:p>
+            <a:pPr lvl="1"/>
+            <a:r>
+              <a:rPr lang="nb-NO" dirty="0" smtClean="0"/>
+              <a:t>Remove</a:t>
+            </a:r>
+          </a:p>
+          <a:p>
+            <a:pPr lvl="1"/>
+            <a:r>
+              <a:rPr lang="nb-NO" dirty="0" smtClean="0"/>
+              <a:t>Test-Prerequisites</a:t>
+            </a:r>
+          </a:p>
+          <a:p>
+            <a:pPr lvl="1"/>
             <a:endParaRPr lang="nb-NO" dirty="0"/>
           </a:p>
         </p:txBody>
@@ -17039,7 +17153,7 @@
           <a:p>
             <a:r>
               <a:rPr lang="nb-NO" dirty="0" smtClean="0"/>
-              <a:t>Arena Delivery configuration</a:t>
+              <a:t>Arena Delivery Artifact content</a:t>
             </a:r>
             <a:endParaRPr lang="nb-NO" dirty="0"/>
           </a:p>
@@ -17092,27 +17206,58 @@
           <a:p>
             <a:r>
               <a:rPr lang="nb-NO" dirty="0" smtClean="0"/>
-              <a:t>A collection of </a:t>
-            </a:r>
-            <a:r>
-              <a:rPr lang="nb-NO" dirty="0"/>
-              <a:t>C</a:t>
-            </a:r>
-            <a:r>
-              <a:rPr lang="nb-NO" dirty="0" smtClean="0"/>
-              <a:t>hocolatey packages for an Arena Client, Server, etc. </a:t>
-            </a:r>
-            <a:r>
-              <a:rPr lang="nb-NO" dirty="0" err="1" smtClean="0"/>
-              <a:t>installation</a:t>
+              <a:t>Reads </a:t>
+            </a:r>
+            <a:r>
+              <a:rPr lang="nb-NO" dirty="0" err="1" smtClean="0"/>
+              <a:t>install_parameters.config</a:t>
+            </a:r>
+            <a:r>
+              <a:rPr lang="nb-NO" dirty="0" smtClean="0"/>
+              <a:t> and </a:t>
+            </a:r>
+            <a:r>
+              <a:rPr lang="nb-NO" dirty="0" err="1" smtClean="0"/>
+              <a:t>parameterMappings.config</a:t>
             </a:r>
             <a:endParaRPr lang="nb-NO" dirty="0" smtClean="0"/>
           </a:p>
           <a:p>
             <a:r>
               <a:rPr lang="nb-NO" dirty="0" smtClean="0"/>
-              <a:t>Zip archive containing Chocolatey packages (offline source), parameter files, and setup scripts to ease the installation</a:t>
-            </a:r>
+              <a:t>Writes final-packages.config, which will set parameters for each individual package</a:t>
+            </a:r>
+          </a:p>
+          <a:p>
+            <a:r>
+              <a:rPr lang="nb-NO" dirty="0" err="1" smtClean="0"/>
+              <a:t>Executes</a:t>
+            </a:r>
+            <a:r>
+              <a:rPr lang="nb-NO" dirty="0" smtClean="0"/>
+              <a:t>: </a:t>
+            </a:r>
+            <a:r>
+              <a:rPr lang="nb-NO" dirty="0" err="1" smtClean="0"/>
+              <a:t>choco</a:t>
+            </a:r>
+            <a:r>
+              <a:rPr lang="nb-NO" dirty="0" smtClean="0"/>
+              <a:t> </a:t>
+            </a:r>
+            <a:r>
+              <a:rPr lang="nb-NO" dirty="0" err="1" smtClean="0"/>
+              <a:t>install</a:t>
+            </a:r>
+            <a:r>
+              <a:rPr lang="nb-NO" dirty="0" smtClean="0"/>
+              <a:t> final-</a:t>
+            </a:r>
+            <a:r>
+              <a:rPr lang="nb-NO" dirty="0" err="1" smtClean="0"/>
+              <a:t>packages.config</a:t>
+            </a:r>
+            <a:endParaRPr lang="nb-NO" dirty="0"/>
           </a:p>
         </p:txBody>
       </p:sp>
@@ -17132,17 +17277,16 @@
           <a:lstStyle/>
           <a:p>
             <a:r>
-              <a:rPr lang="nb-NO" dirty="0" smtClean="0"/>
-              <a:t>DIPS Delivery Packages</a:t>
-            </a:r>
-            <a:endParaRPr lang="nb-NO" dirty="0"/>
+              <a:rPr lang="nb-NO" dirty="0"/>
+              <a:t>Setup.ps1</a:t>
+            </a:r>
           </a:p>
         </p:txBody>
       </p:sp>
     </p:spTree>
     <p:extLst>
       <p:ext uri="{BB962C8B-B14F-4D97-AF65-F5344CB8AC3E}">
-        <p14:creationId xmlns:p14="http://schemas.microsoft.com/office/powerpoint/2010/main" val="1891317082"/>
+        <p14:creationId xmlns:p14="http://schemas.microsoft.com/office/powerpoint/2010/main" val="1214730080"/>
       </p:ext>
     </p:extLst>
   </p:cSld>
@@ -17169,14 +17313,40 @@
           <a:chExt cx="0" cy="0"/>
         </a:xfrm>
       </p:grpSpPr>
-      <p:sp>
-        <p:nvSpPr>
-          <p:cNvPr id="3" name="Content Placeholder 2"/>
-          <p:cNvSpPr>
-            <a:spLocks noGrp="1"/>
-          </p:cNvSpPr>
+      <p:pic>
+        <p:nvPicPr>
+          <p:cNvPr id="2" name="Content Placeholder 1"/>
+          <p:cNvPicPr>
+            <a:picLocks noGrp="1" noChangeAspect="1"/>
+          </p:cNvPicPr>
           <p:nvPr>
             <p:ph idx="1"/>
+          </p:nvPr>
+        </p:nvPicPr>
+        <p:blipFill>
+          <a:blip r:embed="rId2"/>
+          <a:stretch>
+            <a:fillRect/>
+          </a:stretch>
+        </p:blipFill>
+        <p:spPr>
+          <a:xfrm>
+            <a:off x="512413" y="2039038"/>
+            <a:ext cx="4774481" cy="3059377"/>
+          </a:xfrm>
+          <a:prstGeom prst="rect">
+            <a:avLst/>
+          </a:prstGeom>
+        </p:spPr>
+      </p:pic>
+      <p:sp>
+        <p:nvSpPr>
+          <p:cNvPr id="3" name="Title 2"/>
+          <p:cNvSpPr>
+            <a:spLocks noGrp="1"/>
+          </p:cNvSpPr>
+          <p:nvPr>
+            <p:ph type="title"/>
           </p:nvPr>
         </p:nvSpPr>
         <p:spPr/>
@@ -17186,87 +17356,73 @@
           <a:p>
             <a:r>
               <a:rPr lang="nb-NO" dirty="0" smtClean="0"/>
-              <a:t>Reads </a:t>
-            </a:r>
-            <a:r>
-              <a:rPr lang="nb-NO" dirty="0" err="1" smtClean="0"/>
-              <a:t>install_parameters.config</a:t>
-            </a:r>
-            <a:r>
-              <a:rPr lang="nb-NO" dirty="0" smtClean="0"/>
-              <a:t> and </a:t>
-            </a:r>
-            <a:r>
-              <a:rPr lang="nb-NO" dirty="0" err="1" smtClean="0"/>
-              <a:t>parameterMappings.config</a:t>
-            </a:r>
-            <a:endParaRPr lang="nb-NO" dirty="0" smtClean="0"/>
-          </a:p>
-          <a:p>
-            <a:r>
-              <a:rPr lang="nb-NO" dirty="0" smtClean="0"/>
-              <a:t>Writes final-packages.config, which will set parameters for each individual package</a:t>
-            </a:r>
-          </a:p>
-          <a:p>
-            <a:r>
-              <a:rPr lang="nb-NO" dirty="0" err="1" smtClean="0"/>
-              <a:t>Executes</a:t>
-            </a:r>
-            <a:r>
-              <a:rPr lang="nb-NO" dirty="0" smtClean="0"/>
-              <a:t>: </a:t>
-            </a:r>
-            <a:r>
-              <a:rPr lang="nb-NO" dirty="0" err="1" smtClean="0"/>
-              <a:t>choco</a:t>
-            </a:r>
-            <a:r>
-              <a:rPr lang="nb-NO" dirty="0" smtClean="0"/>
-              <a:t> </a:t>
-            </a:r>
-            <a:r>
-              <a:rPr lang="nb-NO" dirty="0" err="1" smtClean="0"/>
-              <a:t>install</a:t>
-            </a:r>
-            <a:r>
-              <a:rPr lang="nb-NO" dirty="0" smtClean="0"/>
-              <a:t> final-</a:t>
-            </a:r>
-            <a:r>
-              <a:rPr lang="nb-NO" dirty="0" err="1" smtClean="0"/>
-              <a:t>packages.config</a:t>
+              <a:t>Let us track a package</a:t>
             </a:r>
             <a:endParaRPr lang="nb-NO" dirty="0"/>
           </a:p>
         </p:txBody>
       </p:sp>
-      <p:sp>
-        <p:nvSpPr>
-          <p:cNvPr id="2" name="Title 1"/>
-          <p:cNvSpPr>
-            <a:spLocks noGrp="1"/>
-          </p:cNvSpPr>
-          <p:nvPr>
-            <p:ph type="title"/>
-          </p:nvPr>
-        </p:nvSpPr>
-        <p:spPr/>
-        <p:txBody>
-          <a:bodyPr/>
-          <a:lstStyle/>
-          <a:p>
-            <a:r>
-              <a:rPr lang="nb-NO" dirty="0"/>
-              <a:t>Setup.ps1</a:t>
-            </a:r>
-          </a:p>
-        </p:txBody>
-      </p:sp>
+      <p:pic>
+        <p:nvPicPr>
+          <p:cNvPr id="5" name="Picture 4"/>
+          <p:cNvPicPr>
+            <a:picLocks noChangeAspect="1"/>
+          </p:cNvPicPr>
+          <p:nvPr/>
+        </p:nvPicPr>
+        <p:blipFill>
+          <a:blip r:embed="rId3"/>
+          <a:stretch>
+            <a:fillRect/>
+          </a:stretch>
+        </p:blipFill>
+        <p:spPr>
+          <a:xfrm>
+            <a:off x="5777345" y="2039038"/>
+            <a:ext cx="5859425" cy="3703474"/>
+          </a:xfrm>
+          <a:prstGeom prst="rect">
+            <a:avLst/>
+          </a:prstGeom>
+        </p:spPr>
+      </p:pic>
+      <p:cxnSp>
+        <p:nvCxnSpPr>
+          <p:cNvPr id="7" name="Straight Arrow Connector 6"/>
+          <p:cNvCxnSpPr/>
+          <p:nvPr/>
+        </p:nvCxnSpPr>
+        <p:spPr>
+          <a:xfrm>
+            <a:off x="1487978" y="4015047"/>
+            <a:ext cx="4289367" cy="1083368"/>
+          </a:xfrm>
+          <a:prstGeom prst="straightConnector1">
+            <a:avLst/>
+          </a:prstGeom>
+          <a:ln>
+            <a:tailEnd type="triangle"/>
+          </a:ln>
+        </p:spPr>
+        <p:style>
+          <a:lnRef idx="1">
+            <a:schemeClr val="accent1"/>
+          </a:lnRef>
+          <a:fillRef idx="0">
+            <a:schemeClr val="accent1"/>
+          </a:fillRef>
+          <a:effectRef idx="0">
+            <a:schemeClr val="accent1"/>
+          </a:effectRef>
+          <a:fontRef idx="minor">
+            <a:schemeClr val="tx1"/>
+          </a:fontRef>
+        </p:style>
+      </p:cxnSp>
     </p:spTree>
     <p:extLst>
       <p:ext uri="{BB962C8B-B14F-4D97-AF65-F5344CB8AC3E}">
-        <p14:creationId xmlns:p14="http://schemas.microsoft.com/office/powerpoint/2010/main" val="1214730080"/>
+        <p14:creationId xmlns:p14="http://schemas.microsoft.com/office/powerpoint/2010/main" val="988075650"/>
       </p:ext>
     </p:extLst>
   </p:cSld>
@@ -17293,14 +17449,40 @@
           <a:chExt cx="0" cy="0"/>
         </a:xfrm>
       </p:grpSpPr>
-      <p:sp>
-        <p:nvSpPr>
-          <p:cNvPr id="3" name="Content Placeholder 2"/>
-          <p:cNvSpPr>
-            <a:spLocks noGrp="1"/>
-          </p:cNvSpPr>
+      <p:pic>
+        <p:nvPicPr>
+          <p:cNvPr id="4" name="Content Placeholder 3"/>
+          <p:cNvPicPr>
+            <a:picLocks noGrp="1" noChangeAspect="1"/>
+          </p:cNvPicPr>
           <p:nvPr>
             <p:ph idx="1"/>
+          </p:nvPr>
+        </p:nvPicPr>
+        <p:blipFill>
+          <a:blip r:embed="rId2"/>
+          <a:stretch>
+            <a:fillRect/>
+          </a:stretch>
+        </p:blipFill>
+        <p:spPr>
+          <a:xfrm>
+            <a:off x="6307354" y="287049"/>
+            <a:ext cx="3401911" cy="6038240"/>
+          </a:xfrm>
+          <a:prstGeom prst="rect">
+            <a:avLst/>
+          </a:prstGeom>
+        </p:spPr>
+      </p:pic>
+      <p:sp>
+        <p:nvSpPr>
+          <p:cNvPr id="3" name="Title 2"/>
+          <p:cNvSpPr>
+            <a:spLocks noGrp="1"/>
+          </p:cNvSpPr>
+          <p:nvPr>
+            <p:ph type="title"/>
           </p:nvPr>
         </p:nvSpPr>
         <p:spPr/>
@@ -17310,132 +17492,73 @@
           <a:p>
             <a:r>
               <a:rPr lang="nb-NO" dirty="0" smtClean="0"/>
-              <a:t>Chocolatey is not a tool that is designed to be used for database migrations</a:t>
-            </a:r>
-          </a:p>
-          <a:p>
-            <a:r>
-              <a:rPr lang="nb-NO" dirty="0" smtClean="0"/>
-              <a:t>DIPS </a:t>
-            </a:r>
-            <a:r>
-              <a:rPr lang="nb-NO" dirty="0" err="1" smtClean="0"/>
-              <a:t>proprietary</a:t>
-            </a:r>
-            <a:r>
-              <a:rPr lang="nb-NO" dirty="0" smtClean="0"/>
-              <a:t> </a:t>
-            </a:r>
-            <a:r>
-              <a:rPr lang="nb-NO" dirty="0" err="1" smtClean="0"/>
-              <a:t>usage</a:t>
-            </a:r>
-            <a:endParaRPr lang="nb-NO" dirty="0" smtClean="0"/>
-          </a:p>
-          <a:p>
-            <a:r>
-              <a:rPr lang="nb-NO" dirty="0" err="1" smtClean="0"/>
-              <a:t>Choosed</a:t>
-            </a:r>
-            <a:r>
-              <a:rPr lang="nb-NO" dirty="0" smtClean="0"/>
-              <a:t> </a:t>
-            </a:r>
-            <a:r>
-              <a:rPr lang="nb-NO" dirty="0" err="1" smtClean="0"/>
-              <a:t>because</a:t>
-            </a:r>
-            <a:r>
-              <a:rPr lang="nb-NO" dirty="0" smtClean="0"/>
-              <a:t> </a:t>
-            </a:r>
-            <a:r>
-              <a:rPr lang="nb-NO" dirty="0" err="1" smtClean="0"/>
-              <a:t>we</a:t>
-            </a:r>
-            <a:r>
-              <a:rPr lang="nb-NO" dirty="0" smtClean="0"/>
-              <a:t> </a:t>
-            </a:r>
-            <a:r>
-              <a:rPr lang="nb-NO" dirty="0" err="1" smtClean="0"/>
-              <a:t>needed</a:t>
-            </a:r>
-            <a:r>
-              <a:rPr lang="nb-NO" dirty="0" smtClean="0"/>
-              <a:t> </a:t>
-            </a:r>
-            <a:r>
-              <a:rPr lang="nb-NO" dirty="0" err="1" smtClean="0"/>
-              <a:t>something</a:t>
-            </a:r>
-            <a:r>
-              <a:rPr lang="nb-NO" dirty="0" smtClean="0"/>
-              <a:t> </a:t>
-            </a:r>
-            <a:r>
-              <a:rPr lang="nb-NO" dirty="0" err="1" smtClean="0"/>
-              <a:t>that</a:t>
-            </a:r>
-            <a:r>
-              <a:rPr lang="nb-NO" dirty="0" smtClean="0"/>
-              <a:t>:</a:t>
-            </a:r>
-          </a:p>
-          <a:p>
-            <a:pPr lvl="1"/>
-            <a:r>
-              <a:rPr lang="nb-NO" dirty="0" smtClean="0"/>
-              <a:t>Packages upgrade (dupfiles) for each program package (artifacts)</a:t>
-            </a:r>
-          </a:p>
-          <a:p>
-            <a:pPr lvl="1"/>
-            <a:r>
-              <a:rPr lang="nb-NO" dirty="0" smtClean="0"/>
-              <a:t>Handles </a:t>
-            </a:r>
-            <a:r>
-              <a:rPr lang="nb-NO" dirty="0" err="1" smtClean="0"/>
-              <a:t>dependencies</a:t>
-            </a:r>
-            <a:endParaRPr lang="nb-NO" dirty="0" smtClean="0"/>
-          </a:p>
-          <a:p>
-            <a:pPr marL="457200" lvl="1" indent="0">
-              <a:buNone/>
-            </a:pPr>
+              <a:t>Parameter mapping</a:t>
+            </a:r>
             <a:endParaRPr lang="nb-NO" dirty="0"/>
           </a:p>
         </p:txBody>
       </p:sp>
-      <p:sp>
-        <p:nvSpPr>
-          <p:cNvPr id="2" name="Title 1"/>
-          <p:cNvSpPr>
-            <a:spLocks noGrp="1"/>
-          </p:cNvSpPr>
-          <p:nvPr>
-            <p:ph type="title"/>
-          </p:nvPr>
-        </p:nvSpPr>
-        <p:spPr/>
-        <p:txBody>
-          <a:bodyPr/>
-          <a:lstStyle/>
-          <a:p>
-            <a:r>
-              <a:rPr lang="nb-NO" dirty="0" smtClean="0"/>
-              <a:t>Database</a:t>
-            </a:r>
-            <a:endParaRPr lang="nb-NO" dirty="0"/>
-          </a:p>
-        </p:txBody>
-      </p:sp>
+      <p:pic>
+        <p:nvPicPr>
+          <p:cNvPr id="5" name="Picture 4"/>
+          <p:cNvPicPr>
+            <a:picLocks noChangeAspect="1"/>
+          </p:cNvPicPr>
+          <p:nvPr/>
+        </p:nvPicPr>
+        <p:blipFill>
+          <a:blip r:embed="rId3"/>
+          <a:stretch>
+            <a:fillRect/>
+          </a:stretch>
+        </p:blipFill>
+        <p:spPr>
+          <a:xfrm>
+            <a:off x="380877" y="1933680"/>
+            <a:ext cx="5379844" cy="2592988"/>
+          </a:xfrm>
+          <a:prstGeom prst="rect">
+            <a:avLst/>
+          </a:prstGeom>
+        </p:spPr>
+      </p:pic>
+      <p:cxnSp>
+        <p:nvCxnSpPr>
+          <p:cNvPr id="7" name="Straight Arrow Connector 6"/>
+          <p:cNvCxnSpPr/>
+          <p:nvPr/>
+        </p:nvCxnSpPr>
+        <p:spPr>
+          <a:xfrm flipV="1">
+            <a:off x="1820487" y="3306169"/>
+            <a:ext cx="4227507" cy="442871"/>
+          </a:xfrm>
+          <a:prstGeom prst="straightConnector1">
+            <a:avLst/>
+          </a:prstGeom>
+          <a:ln>
+            <a:tailEnd type="triangle"/>
+          </a:ln>
+        </p:spPr>
+        <p:style>
+          <a:lnRef idx="1">
+            <a:schemeClr val="accent1"/>
+          </a:lnRef>
+          <a:fillRef idx="0">
+            <a:schemeClr val="accent1"/>
+          </a:fillRef>
+          <a:effectRef idx="0">
+            <a:schemeClr val="accent1"/>
+          </a:effectRef>
+          <a:fontRef idx="minor">
+            <a:schemeClr val="tx1"/>
+          </a:fontRef>
+        </p:style>
+      </p:cxnSp>
     </p:spTree>
     <p:extLst>
       <p:ext uri="{BB962C8B-B14F-4D97-AF65-F5344CB8AC3E}">
-        <p14:creationId xmlns:p14="http://schemas.microsoft.com/office/powerpoint/2010/main" val="1922523215"/>
+        <p14:creationId xmlns:p14="http://schemas.microsoft.com/office/powerpoint/2010/main" val="2131743420"/>
       </p:ext>
     </p:extLst>
   </p:cSld>
@@ -17583,194 +17706,35 @@
           <a:chExt cx="0" cy="0"/>
         </a:xfrm>
       </p:grpSpPr>
-      <p:sp>
-        <p:nvSpPr>
-          <p:cNvPr id="3" name="Content Placeholder 2"/>
-          <p:cNvSpPr>
-            <a:spLocks noGrp="1"/>
-          </p:cNvSpPr>
+      <p:pic>
+        <p:nvPicPr>
+          <p:cNvPr id="4" name="Content Placeholder 3"/>
+          <p:cNvPicPr>
+            <a:picLocks noGrp="1" noChangeAspect="1"/>
+          </p:cNvPicPr>
           <p:nvPr>
             <p:ph idx="1"/>
           </p:nvPr>
-        </p:nvSpPr>
-        <p:spPr/>
-        <p:txBody>
-          <a:bodyPr>
-            <a:normAutofit lnSpcReduction="10000"/>
-          </a:bodyPr>
-          <a:lstStyle/>
-          <a:p>
-            <a:r>
-              <a:rPr lang="nb-NO" dirty="0" smtClean="0"/>
-              <a:t>DIPS Chocolatey packages for database is a highly proprietary and customized solution</a:t>
-            </a:r>
-            <a:endParaRPr lang="nb-NO" dirty="0"/>
-          </a:p>
-          <a:p>
-            <a:r>
-              <a:rPr lang="nb-NO" dirty="0" smtClean="0"/>
-              <a:t>No one else as far as we know uses </a:t>
-            </a:r>
-            <a:r>
-              <a:rPr lang="nb-NO" dirty="0"/>
-              <a:t>C</a:t>
-            </a:r>
-            <a:r>
-              <a:rPr lang="nb-NO" dirty="0" smtClean="0"/>
-              <a:t>hocolatey for database</a:t>
-            </a:r>
-          </a:p>
-          <a:p>
-            <a:r>
-              <a:rPr lang="nb-NO" dirty="0" smtClean="0"/>
-              <a:t>Chocolatey is </a:t>
-            </a:r>
-            <a:r>
-              <a:rPr lang="nb-NO" dirty="0" err="1" smtClean="0"/>
-              <a:t>intended</a:t>
-            </a:r>
-            <a:r>
-              <a:rPr lang="nb-NO" dirty="0" smtClean="0"/>
-              <a:t> for </a:t>
-            </a:r>
-            <a:r>
-              <a:rPr lang="nb-NO" dirty="0" err="1" smtClean="0"/>
-              <a:t>software</a:t>
-            </a:r>
-            <a:r>
-              <a:rPr lang="nb-NO" dirty="0" smtClean="0"/>
-              <a:t> </a:t>
-            </a:r>
-            <a:r>
-              <a:rPr lang="nb-NO" dirty="0" err="1" smtClean="0"/>
-              <a:t>that</a:t>
-            </a:r>
-            <a:r>
-              <a:rPr lang="nb-NO" dirty="0" smtClean="0"/>
-              <a:t> is </a:t>
-            </a:r>
-            <a:r>
-              <a:rPr lang="nb-NO" dirty="0" err="1" smtClean="0"/>
-              <a:t>installed</a:t>
-            </a:r>
-            <a:r>
-              <a:rPr lang="nb-NO" dirty="0" smtClean="0"/>
-              <a:t> to disk, not database</a:t>
-            </a:r>
-          </a:p>
-          <a:p>
-            <a:r>
-              <a:rPr lang="nb-NO" dirty="0">
-                <a:hlinkClick r:id="rId2"/>
-              </a:rPr>
-              <a:t>https://</a:t>
-            </a:r>
-            <a:r>
-              <a:rPr lang="nb-NO" dirty="0" smtClean="0">
-                <a:hlinkClick r:id="rId2"/>
-              </a:rPr>
-              <a:t>wiki/Database-Chocolateypackages</a:t>
-            </a:r>
-            <a:endParaRPr lang="nb-NO" dirty="0" smtClean="0"/>
-          </a:p>
-          <a:p>
-            <a:r>
-              <a:rPr lang="nb-NO" dirty="0" smtClean="0"/>
-              <a:t>Databases </a:t>
-            </a:r>
-            <a:r>
-              <a:rPr lang="nb-NO" dirty="0" err="1" smtClean="0"/>
-              <a:t>cannot</a:t>
-            </a:r>
-            <a:r>
-              <a:rPr lang="nb-NO" dirty="0" smtClean="0"/>
-              <a:t> be </a:t>
-            </a:r>
-            <a:r>
-              <a:rPr lang="nb-NO" dirty="0" err="1" smtClean="0"/>
-              <a:t>upgraded</a:t>
-            </a:r>
-            <a:r>
-              <a:rPr lang="nb-NO" dirty="0" smtClean="0"/>
-              <a:t> by </a:t>
-            </a:r>
-            <a:r>
-              <a:rPr lang="nb-NO" dirty="0" err="1" smtClean="0"/>
-              <a:t>installing</a:t>
-            </a:r>
-            <a:r>
-              <a:rPr lang="nb-NO" dirty="0" smtClean="0"/>
-              <a:t> </a:t>
-            </a:r>
-            <a:r>
-              <a:rPr lang="nb-NO" dirty="0" err="1" smtClean="0"/>
-              <a:t>chocolatey</a:t>
-            </a:r>
-            <a:r>
-              <a:rPr lang="nb-NO" dirty="0" smtClean="0"/>
-              <a:t> </a:t>
-            </a:r>
-            <a:r>
-              <a:rPr lang="nb-NO" dirty="0" err="1" smtClean="0"/>
-              <a:t>packages</a:t>
-            </a:r>
-            <a:r>
-              <a:rPr lang="nb-NO" dirty="0" smtClean="0"/>
-              <a:t> to disk. A custom tool is required to mirror the</a:t>
-            </a:r>
-            <a:r>
-              <a:rPr lang="nb-NO" dirty="0"/>
-              <a:t> </a:t>
-            </a:r>
-            <a:r>
-              <a:rPr lang="nb-NO" dirty="0" smtClean="0"/>
-              <a:t>packages in the database to disk so that </a:t>
-            </a:r>
-            <a:r>
-              <a:rPr lang="nb-NO" dirty="0"/>
-              <a:t>C</a:t>
-            </a:r>
-            <a:r>
-              <a:rPr lang="nb-NO" dirty="0" smtClean="0"/>
-              <a:t>hocolatey can work with it.</a:t>
-            </a:r>
-          </a:p>
-          <a:p>
-            <a:r>
-              <a:rPr lang="nb-NO" dirty="0" err="1" smtClean="0"/>
-              <a:t>Std</a:t>
-            </a:r>
-            <a:r>
-              <a:rPr lang="nb-NO" dirty="0" smtClean="0"/>
-              <a:t> </a:t>
-            </a:r>
-            <a:r>
-              <a:rPr lang="nb-NO" dirty="0" err="1" smtClean="0"/>
-              <a:t>chocolatey</a:t>
-            </a:r>
-            <a:r>
-              <a:rPr lang="nb-NO" dirty="0" smtClean="0"/>
-              <a:t> </a:t>
-            </a:r>
-            <a:r>
-              <a:rPr lang="nb-NO" dirty="0" err="1" smtClean="0"/>
-              <a:t>package</a:t>
-            </a:r>
-            <a:r>
-              <a:rPr lang="nb-NO" dirty="0" smtClean="0"/>
-              <a:t>: </a:t>
-            </a:r>
-            <a:r>
-              <a:rPr lang="nb-NO" dirty="0" err="1" smtClean="0"/>
-              <a:t>dips-dbupgrade</a:t>
-            </a:r>
-            <a:endParaRPr lang="nb-NO" dirty="0"/>
-          </a:p>
-        </p:txBody>
-      </p:sp>
-      <p:sp>
-        <p:nvSpPr>
-          <p:cNvPr id="2" name="Title 1"/>
+        </p:nvPicPr>
+        <p:blipFill>
+          <a:blip r:embed="rId2"/>
+          <a:stretch>
+            <a:fillRect/>
+          </a:stretch>
+        </p:blipFill>
+        <p:spPr>
+          <a:xfrm>
+            <a:off x="2002365" y="1054139"/>
+            <a:ext cx="7923032" cy="5254338"/>
+          </a:xfrm>
+          <a:prstGeom prst="rect">
+            <a:avLst/>
+          </a:prstGeom>
+        </p:spPr>
+      </p:pic>
+      <p:sp>
+        <p:nvSpPr>
+          <p:cNvPr id="3" name="Title 2"/>
           <p:cNvSpPr>
             <a:spLocks noGrp="1"/>
           </p:cNvSpPr>
@@ -17783,9 +17747,10 @@
           <a:bodyPr/>
           <a:lstStyle/>
           <a:p>
-            <a:r>
-              <a:rPr lang="nb-NO" dirty="0" smtClean="0"/>
-              <a:t>Database</a:t>
+            <a:pPr algn="ctr"/>
+            <a:r>
+              <a:rPr lang="nb-NO" dirty="0" smtClean="0"/>
+              <a:t>ArenaDelivery Configuration</a:t>
             </a:r>
             <a:endParaRPr lang="nb-NO" dirty="0"/>
           </a:p>
@@ -17794,7 +17759,7 @@
     </p:spTree>
     <p:extLst>
       <p:ext uri="{BB962C8B-B14F-4D97-AF65-F5344CB8AC3E}">
-        <p14:creationId xmlns:p14="http://schemas.microsoft.com/office/powerpoint/2010/main" val="3276979433"/>
+        <p14:creationId xmlns:p14="http://schemas.microsoft.com/office/powerpoint/2010/main" val="1015220767"/>
       </p:ext>
     </p:extLst>
   </p:cSld>
@@ -17821,14 +17786,40 @@
           <a:chExt cx="0" cy="0"/>
         </a:xfrm>
       </p:grpSpPr>
-      <p:sp>
-        <p:nvSpPr>
-          <p:cNvPr id="3" name="Content Placeholder 2"/>
-          <p:cNvSpPr>
-            <a:spLocks noGrp="1"/>
-          </p:cNvSpPr>
+      <p:pic>
+        <p:nvPicPr>
+          <p:cNvPr id="4" name="Content Placeholder 3"/>
+          <p:cNvPicPr>
+            <a:picLocks noGrp="1" noChangeAspect="1"/>
+          </p:cNvPicPr>
           <p:nvPr>
             <p:ph idx="1"/>
+          </p:nvPr>
+        </p:nvPicPr>
+        <p:blipFill>
+          <a:blip r:embed="rId2"/>
+          <a:stretch>
+            <a:fillRect/>
+          </a:stretch>
+        </p:blipFill>
+        <p:spPr>
+          <a:xfrm>
+            <a:off x="2775077" y="1700213"/>
+            <a:ext cx="6545008" cy="4537075"/>
+          </a:xfrm>
+          <a:prstGeom prst="rect">
+            <a:avLst/>
+          </a:prstGeom>
+        </p:spPr>
+      </p:pic>
+      <p:sp>
+        <p:nvSpPr>
+          <p:cNvPr id="3" name="Title 2"/>
+          <p:cNvSpPr>
+            <a:spLocks noGrp="1"/>
+          </p:cNvSpPr>
+          <p:nvPr>
+            <p:ph type="title"/>
           </p:nvPr>
         </p:nvSpPr>
         <p:spPr/>
@@ -17837,48 +17828,8 @@
           <a:lstStyle/>
           <a:p>
             <a:r>
-              <a:rPr lang="nb-NO" dirty="0" err="1" smtClean="0"/>
-              <a:t>Dupfiles</a:t>
-            </a:r>
-            <a:endParaRPr lang="nb-NO" dirty="0" smtClean="0"/>
-          </a:p>
-          <a:p>
-            <a:r>
-              <a:rPr lang="nb-NO" dirty="0" err="1" smtClean="0"/>
-              <a:t>Json</a:t>
-            </a:r>
-            <a:r>
-              <a:rPr lang="nb-NO" dirty="0" smtClean="0"/>
-              <a:t>-file</a:t>
-            </a:r>
-          </a:p>
-          <a:p>
-            <a:r>
-              <a:rPr lang="nb-NO" dirty="0" smtClean="0"/>
-              <a:t>chocolateyInstall.ps1</a:t>
-            </a:r>
-            <a:endParaRPr lang="nb-NO" dirty="0"/>
-          </a:p>
-        </p:txBody>
-      </p:sp>
-      <p:sp>
-        <p:nvSpPr>
-          <p:cNvPr id="2" name="Title 1"/>
-          <p:cNvSpPr>
-            <a:spLocks noGrp="1"/>
-          </p:cNvSpPr>
-          <p:nvPr>
-            <p:ph type="title"/>
-          </p:nvPr>
-        </p:nvSpPr>
-        <p:spPr/>
-        <p:txBody>
-          <a:bodyPr/>
-          <a:lstStyle/>
-          <a:p>
-            <a:r>
-              <a:rPr lang="nb-NO" dirty="0" smtClean="0"/>
-              <a:t>A look at a database Chocolatey package</a:t>
+              <a:rPr lang="nb-NO" dirty="0" smtClean="0"/>
+              <a:t>Octopus Deploy Templates</a:t>
             </a:r>
             <a:endParaRPr lang="nb-NO" dirty="0"/>
           </a:p>
@@ -17887,7 +17838,7 @@
     </p:spTree>
     <p:extLst>
       <p:ext uri="{BB962C8B-B14F-4D97-AF65-F5344CB8AC3E}">
-        <p14:creationId xmlns:p14="http://schemas.microsoft.com/office/powerpoint/2010/main" val="117989733"/>
+        <p14:creationId xmlns:p14="http://schemas.microsoft.com/office/powerpoint/2010/main" val="56516142"/>
       </p:ext>
     </p:extLst>
   </p:cSld>
@@ -17914,14 +17865,40 @@
           <a:chExt cx="0" cy="0"/>
         </a:xfrm>
       </p:grpSpPr>
-      <p:sp>
-        <p:nvSpPr>
-          <p:cNvPr id="3" name="Content Placeholder 2"/>
-          <p:cNvSpPr>
-            <a:spLocks noGrp="1"/>
-          </p:cNvSpPr>
+      <p:pic>
+        <p:nvPicPr>
+          <p:cNvPr id="4" name="Content Placeholder 3"/>
+          <p:cNvPicPr>
+            <a:picLocks noGrp="1" noChangeAspect="1"/>
+          </p:cNvPicPr>
           <p:nvPr>
             <p:ph idx="1"/>
+          </p:nvPr>
+        </p:nvPicPr>
+        <p:blipFill>
+          <a:blip r:embed="rId2"/>
+          <a:stretch>
+            <a:fillRect/>
+          </a:stretch>
+        </p:blipFill>
+        <p:spPr>
+          <a:xfrm>
+            <a:off x="2407927" y="1409267"/>
+            <a:ext cx="6930174" cy="4537075"/>
+          </a:xfrm>
+          <a:prstGeom prst="rect">
+            <a:avLst/>
+          </a:prstGeom>
+        </p:spPr>
+      </p:pic>
+      <p:sp>
+        <p:nvSpPr>
+          <p:cNvPr id="3" name="Title 2"/>
+          <p:cNvSpPr>
+            <a:spLocks noGrp="1"/>
+          </p:cNvSpPr>
+          <p:nvPr>
+            <p:ph type="title"/>
           </p:nvPr>
         </p:nvSpPr>
         <p:spPr/>
@@ -17931,130 +17908,7 @@
           <a:p>
             <a:r>
               <a:rPr lang="nb-NO" dirty="0" smtClean="0"/>
-              <a:t>dips-dbupgrade is a Chocolatey package that installs a powershell module named DIPSDBupgrade.</a:t>
-            </a:r>
-          </a:p>
-          <a:p>
-            <a:r>
-              <a:rPr lang="nb-NO" dirty="0" smtClean="0"/>
-              <a:t>The </a:t>
-            </a:r>
-            <a:r>
-              <a:rPr lang="nb-NO" dirty="0" err="1" smtClean="0"/>
-              <a:t>module</a:t>
-            </a:r>
-            <a:r>
-              <a:rPr lang="nb-NO" dirty="0" smtClean="0"/>
-              <a:t> </a:t>
-            </a:r>
-            <a:r>
-              <a:rPr lang="nb-NO" dirty="0" err="1" smtClean="0"/>
-              <a:t>contains</a:t>
-            </a:r>
-            <a:r>
-              <a:rPr lang="nb-NO" dirty="0" smtClean="0"/>
-              <a:t> </a:t>
-            </a:r>
-            <a:r>
-              <a:rPr lang="nb-NO" dirty="0" err="1" smtClean="0"/>
-              <a:t>the</a:t>
-            </a:r>
-            <a:r>
-              <a:rPr lang="nb-NO" dirty="0" smtClean="0"/>
-              <a:t> </a:t>
-            </a:r>
-            <a:r>
-              <a:rPr lang="nb-NO" dirty="0" err="1" smtClean="0"/>
-              <a:t>function</a:t>
-            </a:r>
-            <a:r>
-              <a:rPr lang="nb-NO" dirty="0" smtClean="0"/>
-              <a:t>: </a:t>
-            </a:r>
-            <a:r>
-              <a:rPr lang="nb-NO" dirty="0" err="1" smtClean="0"/>
-              <a:t>Install-Databasepackages</a:t>
-            </a:r>
-            <a:endParaRPr lang="nb-NO" dirty="0" smtClean="0"/>
-          </a:p>
-          <a:p>
-            <a:endParaRPr lang="nb-NO" dirty="0"/>
-          </a:p>
-          <a:p>
-            <a:r>
-              <a:rPr lang="nb-NO" dirty="0" err="1" smtClean="0"/>
-              <a:t>Install-DatabasePackages</a:t>
-            </a:r>
-            <a:r>
-              <a:rPr lang="nb-NO" dirty="0" smtClean="0"/>
-              <a:t> –</a:t>
-            </a:r>
-            <a:r>
-              <a:rPr lang="nb-NO" dirty="0" err="1" smtClean="0"/>
-              <a:t>Packages</a:t>
-            </a:r>
-            <a:r>
-              <a:rPr lang="nb-NO" dirty="0" smtClean="0"/>
-              <a:t> </a:t>
-            </a:r>
-            <a:r>
-              <a:rPr lang="nb-NO" dirty="0" err="1" smtClean="0"/>
-              <a:t>packageId</a:t>
-            </a:r>
-            <a:r>
-              <a:rPr lang="nb-NO" dirty="0" smtClean="0"/>
-              <a:t> –Source c:\temp –Database vd-dbbuild10/</a:t>
-            </a:r>
-            <a:r>
-              <a:rPr lang="nb-NO" dirty="0" err="1" smtClean="0"/>
-              <a:t>dips</a:t>
-            </a:r>
-            <a:r>
-              <a:rPr lang="nb-NO" dirty="0" smtClean="0"/>
-              <a:t> –</a:t>
-            </a:r>
-            <a:r>
-              <a:rPr lang="nb-NO" dirty="0" err="1" smtClean="0"/>
-              <a:t>InstallDir</a:t>
-            </a:r>
-            <a:r>
-              <a:rPr lang="nb-NO" dirty="0" smtClean="0"/>
-              <a:t> c:\temp –</a:t>
-            </a:r>
-            <a:r>
-              <a:rPr lang="nb-NO" dirty="0" err="1" smtClean="0"/>
-              <a:t>Password</a:t>
-            </a:r>
-            <a:r>
-              <a:rPr lang="nb-NO" dirty="0" smtClean="0"/>
-              <a:t> </a:t>
-            </a:r>
-            <a:r>
-              <a:rPr lang="nb-NO" dirty="0" err="1" smtClean="0"/>
-              <a:t>oracle</a:t>
-            </a:r>
-            <a:endParaRPr lang="nb-NO" dirty="0"/>
-          </a:p>
-        </p:txBody>
-      </p:sp>
-      <p:sp>
-        <p:nvSpPr>
-          <p:cNvPr id="2" name="Title 1"/>
-          <p:cNvSpPr>
-            <a:spLocks noGrp="1"/>
-          </p:cNvSpPr>
-          <p:nvPr>
-            <p:ph type="title"/>
-          </p:nvPr>
-        </p:nvSpPr>
-        <p:spPr/>
-        <p:txBody>
-          <a:bodyPr/>
-          <a:lstStyle/>
-          <a:p>
-            <a:r>
-              <a:rPr lang="nb-NO" dirty="0" err="1" smtClean="0"/>
-              <a:t>dips-dbupgrade</a:t>
+              <a:t>Templates – Package List</a:t>
             </a:r>
             <a:endParaRPr lang="nb-NO" dirty="0"/>
           </a:p>
@@ -18063,7 +17917,7 @@
     </p:spTree>
     <p:extLst>
       <p:ext uri="{BB962C8B-B14F-4D97-AF65-F5344CB8AC3E}">
-        <p14:creationId xmlns:p14="http://schemas.microsoft.com/office/powerpoint/2010/main" val="3039931082"/>
+        <p14:creationId xmlns:p14="http://schemas.microsoft.com/office/powerpoint/2010/main" val="2698130261"/>
       </p:ext>
     </p:extLst>
   </p:cSld>
@@ -18090,311 +17944,35 @@
           <a:chExt cx="0" cy="0"/>
         </a:xfrm>
       </p:grpSpPr>
-      <p:sp>
-        <p:nvSpPr>
-          <p:cNvPr id="3" name="Content Placeholder 2"/>
-          <p:cNvSpPr>
-            <a:spLocks noGrp="1"/>
-          </p:cNvSpPr>
+      <p:pic>
+        <p:nvPicPr>
+          <p:cNvPr id="4" name="Content Placeholder 3"/>
+          <p:cNvPicPr>
+            <a:picLocks noGrp="1" noChangeAspect="1"/>
+          </p:cNvPicPr>
           <p:nvPr>
             <p:ph idx="1"/>
           </p:nvPr>
-        </p:nvSpPr>
-        <p:spPr/>
-        <p:txBody>
-          <a:bodyPr>
-            <a:normAutofit lnSpcReduction="10000"/>
-          </a:bodyPr>
-          <a:lstStyle/>
-          <a:p>
-            <a:pPr marL="514350" indent="-514350">
-              <a:buFont typeface="+mj-lt"/>
-              <a:buAutoNum type="arabicPeriod"/>
-            </a:pPr>
-            <a:r>
-              <a:rPr lang="nb-NO" dirty="0" smtClean="0"/>
-              <a:t>Tests </a:t>
-            </a:r>
-            <a:r>
-              <a:rPr lang="nb-NO" dirty="0" err="1" smtClean="0"/>
-              <a:t>that</a:t>
-            </a:r>
-            <a:r>
-              <a:rPr lang="nb-NO" dirty="0" smtClean="0"/>
-              <a:t> </a:t>
-            </a:r>
-            <a:r>
-              <a:rPr lang="nb-NO" dirty="0" err="1" smtClean="0"/>
-              <a:t>the</a:t>
-            </a:r>
-            <a:r>
-              <a:rPr lang="nb-NO" dirty="0" smtClean="0"/>
-              <a:t> </a:t>
-            </a:r>
-            <a:r>
-              <a:rPr lang="nb-NO" dirty="0" err="1" smtClean="0"/>
-              <a:t>specified</a:t>
-            </a:r>
-            <a:r>
-              <a:rPr lang="nb-NO" dirty="0" smtClean="0"/>
-              <a:t> database </a:t>
-            </a:r>
-            <a:r>
-              <a:rPr lang="nb-NO" dirty="0" err="1" smtClean="0"/>
-              <a:t>can</a:t>
-            </a:r>
-            <a:r>
-              <a:rPr lang="nb-NO" dirty="0" smtClean="0"/>
-              <a:t> be </a:t>
-            </a:r>
-            <a:r>
-              <a:rPr lang="nb-NO" dirty="0" err="1" smtClean="0"/>
-              <a:t>connected</a:t>
-            </a:r>
-            <a:r>
-              <a:rPr lang="nb-NO" dirty="0" smtClean="0"/>
-              <a:t> to and </a:t>
-            </a:r>
-            <a:r>
-              <a:rPr lang="nb-NO" dirty="0" err="1" smtClean="0"/>
-              <a:t>that</a:t>
-            </a:r>
-            <a:r>
-              <a:rPr lang="nb-NO" dirty="0" smtClean="0"/>
-              <a:t> it is a DIPS database (</a:t>
-            </a:r>
-            <a:r>
-              <a:rPr lang="nb-NO" dirty="0" err="1" smtClean="0"/>
-              <a:t>i.e</a:t>
-            </a:r>
-            <a:r>
-              <a:rPr lang="nb-NO" dirty="0" smtClean="0"/>
-              <a:t> not a </a:t>
-            </a:r>
-            <a:r>
-              <a:rPr lang="nb-NO" dirty="0" err="1" smtClean="0"/>
-              <a:t>datamart</a:t>
-            </a:r>
-            <a:r>
-              <a:rPr lang="nb-NO" dirty="0" smtClean="0"/>
-              <a:t>)</a:t>
-            </a:r>
-          </a:p>
-          <a:p>
-            <a:pPr marL="514350" indent="-514350">
-              <a:buFont typeface="+mj-lt"/>
-              <a:buAutoNum type="arabicPeriod"/>
-            </a:pPr>
-            <a:r>
-              <a:rPr lang="nb-NO" dirty="0" err="1" smtClean="0"/>
-              <a:t>Executes</a:t>
-            </a:r>
-            <a:r>
-              <a:rPr lang="nb-NO" dirty="0" smtClean="0"/>
-              <a:t> </a:t>
-            </a:r>
-            <a:r>
-              <a:rPr lang="nb-NO" dirty="0" err="1" smtClean="0"/>
-              <a:t>prerequsites</a:t>
-            </a:r>
-            <a:r>
-              <a:rPr lang="nb-NO" dirty="0" smtClean="0"/>
-              <a:t> tests (</a:t>
-            </a:r>
-            <a:r>
-              <a:rPr lang="nb-NO" dirty="0" err="1" smtClean="0"/>
-              <a:t>dupconsole</a:t>
-            </a:r>
-            <a:r>
-              <a:rPr lang="nb-NO" dirty="0" smtClean="0"/>
-              <a:t>, </a:t>
-            </a:r>
-            <a:r>
-              <a:rPr lang="nb-NO" dirty="0" err="1" smtClean="0"/>
-              <a:t>path</a:t>
-            </a:r>
-            <a:r>
-              <a:rPr lang="nb-NO" dirty="0" smtClean="0"/>
-              <a:t>)</a:t>
-            </a:r>
-          </a:p>
-          <a:p>
-            <a:pPr marL="514350" indent="-514350">
-              <a:buFont typeface="+mj-lt"/>
-              <a:buAutoNum type="arabicPeriod"/>
-            </a:pPr>
-            <a:r>
-              <a:rPr lang="nb-NO" dirty="0" err="1" smtClean="0"/>
-              <a:t>Creates</a:t>
-            </a:r>
-            <a:r>
-              <a:rPr lang="nb-NO" dirty="0" smtClean="0"/>
-              <a:t> a </a:t>
-            </a:r>
-            <a:r>
-              <a:rPr lang="nb-NO" dirty="0" err="1" smtClean="0"/>
-              <a:t>new</a:t>
-            </a:r>
-            <a:r>
-              <a:rPr lang="nb-NO" dirty="0" smtClean="0"/>
-              <a:t> folder </a:t>
-            </a:r>
-            <a:r>
-              <a:rPr lang="nb-NO" dirty="0" err="1" smtClean="0"/>
-              <a:t>inside</a:t>
-            </a:r>
-            <a:r>
-              <a:rPr lang="nb-NO" dirty="0" smtClean="0"/>
-              <a:t> </a:t>
-            </a:r>
-            <a:r>
-              <a:rPr lang="nb-NO" dirty="0" err="1" smtClean="0"/>
-              <a:t>installDir</a:t>
-            </a:r>
-            <a:r>
-              <a:rPr lang="nb-NO" dirty="0" smtClean="0"/>
-              <a:t>: vd-dbbuild10-dips-20190610-101010</a:t>
-            </a:r>
-          </a:p>
-          <a:p>
-            <a:pPr marL="514350" indent="-514350">
-              <a:buFont typeface="+mj-lt"/>
-              <a:buAutoNum type="arabicPeriod"/>
-            </a:pPr>
-            <a:r>
-              <a:rPr lang="nb-NO" dirty="0" smtClean="0"/>
-              <a:t>Sets </a:t>
-            </a:r>
-            <a:r>
-              <a:rPr lang="nb-NO" dirty="0"/>
-              <a:t>C</a:t>
-            </a:r>
-            <a:r>
-              <a:rPr lang="nb-NO" dirty="0" smtClean="0"/>
-              <a:t>hocolatey to work with this directory as its working directory (i.e. like a </a:t>
-            </a:r>
-            <a:r>
-              <a:rPr lang="nb-NO" dirty="0" err="1" smtClean="0"/>
-              <a:t>clean</a:t>
-            </a:r>
-            <a:r>
-              <a:rPr lang="nb-NO" dirty="0" smtClean="0"/>
-              <a:t> </a:t>
-            </a:r>
-            <a:r>
-              <a:rPr lang="nb-NO" dirty="0" err="1" smtClean="0"/>
-              <a:t>machine</a:t>
-            </a:r>
-            <a:r>
-              <a:rPr lang="nb-NO" dirty="0" smtClean="0"/>
-              <a:t>)</a:t>
-            </a:r>
-          </a:p>
-          <a:p>
-            <a:pPr marL="514350" indent="-514350">
-              <a:buFont typeface="+mj-lt"/>
-              <a:buAutoNum type="arabicPeriod"/>
-            </a:pPr>
-            <a:r>
-              <a:rPr lang="nb-NO" dirty="0" smtClean="0"/>
-              <a:t>Queries the database for all installed packages</a:t>
-            </a:r>
-          </a:p>
-          <a:p>
-            <a:pPr marL="514350" indent="-514350">
-              <a:buFont typeface="+mj-lt"/>
-              <a:buAutoNum type="arabicPeriod"/>
-            </a:pPr>
-            <a:r>
-              <a:rPr lang="nb-NO" dirty="0" err="1" smtClean="0"/>
-              <a:t>Creates</a:t>
-            </a:r>
-            <a:r>
-              <a:rPr lang="nb-NO" dirty="0" smtClean="0"/>
-              <a:t> a </a:t>
-            </a:r>
-            <a:r>
-              <a:rPr lang="nb-NO" dirty="0" err="1" smtClean="0"/>
-              <a:t>representation</a:t>
-            </a:r>
-            <a:r>
-              <a:rPr lang="nb-NO" dirty="0" smtClean="0"/>
-              <a:t> </a:t>
-            </a:r>
-            <a:r>
-              <a:rPr lang="nb-NO" dirty="0" err="1" smtClean="0"/>
-              <a:t>of</a:t>
-            </a:r>
-            <a:r>
-              <a:rPr lang="nb-NO" dirty="0" smtClean="0"/>
-              <a:t> all </a:t>
-            </a:r>
-            <a:r>
-              <a:rPr lang="nb-NO" dirty="0" err="1" smtClean="0"/>
-              <a:t>the</a:t>
-            </a:r>
-            <a:r>
-              <a:rPr lang="nb-NO" dirty="0" smtClean="0"/>
-              <a:t> </a:t>
-            </a:r>
-            <a:r>
-              <a:rPr lang="nb-NO" dirty="0" err="1" smtClean="0"/>
-              <a:t>packages</a:t>
-            </a:r>
-            <a:r>
-              <a:rPr lang="nb-NO" dirty="0" smtClean="0"/>
-              <a:t> in </a:t>
-            </a:r>
-            <a:r>
-              <a:rPr lang="nb-NO" dirty="0" err="1" smtClean="0"/>
-              <a:t>the</a:t>
-            </a:r>
-            <a:r>
-              <a:rPr lang="nb-NO" dirty="0" smtClean="0"/>
-              <a:t> database in :$</a:t>
-            </a:r>
-            <a:r>
-              <a:rPr lang="nb-NO" dirty="0" err="1" smtClean="0"/>
-              <a:t>InstallDir</a:t>
-            </a:r>
-            <a:r>
-              <a:rPr lang="nb-NO" dirty="0" smtClean="0"/>
-              <a:t>\database-date-time\</a:t>
-            </a:r>
-            <a:r>
-              <a:rPr lang="nb-NO" dirty="0" err="1" smtClean="0"/>
-              <a:t>choco</a:t>
-            </a:r>
-            <a:r>
-              <a:rPr lang="nb-NO" dirty="0" smtClean="0"/>
-              <a:t>\</a:t>
-            </a:r>
-            <a:r>
-              <a:rPr lang="nb-NO" dirty="0" err="1" smtClean="0"/>
-              <a:t>chocolatey</a:t>
-            </a:r>
-            <a:r>
-              <a:rPr lang="nb-NO" dirty="0" smtClean="0"/>
-              <a:t>\</a:t>
-            </a:r>
-            <a:r>
-              <a:rPr lang="nb-NO" dirty="0" err="1" smtClean="0"/>
-              <a:t>lib</a:t>
-            </a:r>
-            <a:endParaRPr lang="nb-NO" dirty="0" smtClean="0"/>
-          </a:p>
-          <a:p>
-            <a:pPr marL="514350" indent="-514350">
-              <a:buFont typeface="+mj-lt"/>
-              <a:buAutoNum type="arabicPeriod"/>
-            </a:pPr>
-            <a:endParaRPr lang="nb-NO" dirty="0"/>
-          </a:p>
-        </p:txBody>
-      </p:sp>
-      <p:sp>
-        <p:nvSpPr>
-          <p:cNvPr id="2" name="Title 1"/>
+        </p:nvPicPr>
+        <p:blipFill>
+          <a:blip r:embed="rId2"/>
+          <a:stretch>
+            <a:fillRect/>
+          </a:stretch>
+        </p:blipFill>
+        <p:spPr>
+          <a:xfrm>
+            <a:off x="1598592" y="1340769"/>
+            <a:ext cx="8898803" cy="4537075"/>
+          </a:xfrm>
+          <a:prstGeom prst="rect">
+            <a:avLst/>
+          </a:prstGeom>
+        </p:spPr>
+      </p:pic>
+      <p:sp>
+        <p:nvSpPr>
+          <p:cNvPr id="3" name="Title 2"/>
           <p:cNvSpPr>
             <a:spLocks noGrp="1"/>
           </p:cNvSpPr>
@@ -18408,8 +17986,8 @@
           <a:lstStyle/>
           <a:p>
             <a:r>
-              <a:rPr lang="nb-NO" dirty="0" err="1" smtClean="0"/>
-              <a:t>Install-DatabasePackages</a:t>
+              <a:rPr lang="nb-NO" dirty="0" smtClean="0"/>
+              <a:t>DIPS-Nuget</a:t>
             </a:r>
             <a:endParaRPr lang="nb-NO" dirty="0"/>
           </a:p>
@@ -18418,7 +17996,7 @@
     </p:spTree>
     <p:extLst>
       <p:ext uri="{BB962C8B-B14F-4D97-AF65-F5344CB8AC3E}">
-        <p14:creationId xmlns:p14="http://schemas.microsoft.com/office/powerpoint/2010/main" val="1604630973"/>
+        <p14:creationId xmlns:p14="http://schemas.microsoft.com/office/powerpoint/2010/main" val="3369649050"/>
       </p:ext>
     </p:extLst>
   </p:cSld>
@@ -18445,316 +18023,35 @@
           <a:chExt cx="0" cy="0"/>
         </a:xfrm>
       </p:grpSpPr>
-      <p:sp>
-        <p:nvSpPr>
-          <p:cNvPr id="3" name="Content Placeholder 2"/>
-          <p:cNvSpPr>
-            <a:spLocks noGrp="1"/>
-          </p:cNvSpPr>
+      <p:pic>
+        <p:nvPicPr>
+          <p:cNvPr id="4" name="Content Placeholder 3"/>
+          <p:cNvPicPr>
+            <a:picLocks noGrp="1" noChangeAspect="1"/>
+          </p:cNvPicPr>
           <p:nvPr>
             <p:ph idx="1"/>
           </p:nvPr>
-        </p:nvSpPr>
-        <p:spPr/>
-        <p:txBody>
-          <a:bodyPr>
-            <a:normAutofit/>
-          </a:bodyPr>
-          <a:lstStyle/>
-          <a:p>
-            <a:pPr marL="514350" indent="-514350">
-              <a:buFont typeface="+mj-lt"/>
-              <a:buAutoNum type="arabicPeriod" startAt="7"/>
-            </a:pPr>
-            <a:r>
-              <a:rPr lang="nb-NO" dirty="0" err="1" smtClean="0"/>
-              <a:t>Installs</a:t>
-            </a:r>
-            <a:r>
-              <a:rPr lang="nb-NO" dirty="0" smtClean="0"/>
-              <a:t> </a:t>
-            </a:r>
-            <a:r>
-              <a:rPr lang="nb-NO" dirty="0" err="1"/>
-              <a:t>packages</a:t>
-            </a:r>
-            <a:r>
-              <a:rPr lang="nb-NO" dirty="0"/>
-              <a:t> </a:t>
-            </a:r>
-            <a:r>
-              <a:rPr lang="nb-NO" dirty="0" err="1"/>
-              <a:t>into</a:t>
-            </a:r>
-            <a:r>
-              <a:rPr lang="nb-NO" dirty="0"/>
-              <a:t> :$</a:t>
-            </a:r>
-            <a:r>
-              <a:rPr lang="nb-NO" dirty="0" err="1" smtClean="0"/>
-              <a:t>InstallDir</a:t>
-            </a:r>
-            <a:r>
-              <a:rPr lang="nb-NO" dirty="0" smtClean="0"/>
-              <a:t>\database-date-time\</a:t>
-            </a:r>
-            <a:r>
-              <a:rPr lang="nb-NO" dirty="0" err="1" smtClean="0"/>
-              <a:t>choco</a:t>
-            </a:r>
-            <a:r>
-              <a:rPr lang="nb-NO" dirty="0" smtClean="0"/>
-              <a:t>\</a:t>
-            </a:r>
-            <a:r>
-              <a:rPr lang="nb-NO" dirty="0" err="1" smtClean="0"/>
-              <a:t>lib</a:t>
-            </a:r>
-            <a:endParaRPr lang="nb-NO" dirty="0"/>
-          </a:p>
-          <a:p>
-            <a:pPr marL="514350" indent="-514350">
-              <a:buFont typeface="+mj-lt"/>
-              <a:buAutoNum type="arabicPeriod" startAt="7"/>
-            </a:pPr>
-            <a:r>
-              <a:rPr lang="nb-NO" dirty="0" err="1" smtClean="0"/>
-              <a:t>Each</a:t>
-            </a:r>
-            <a:r>
-              <a:rPr lang="nb-NO" dirty="0" smtClean="0"/>
-              <a:t> </a:t>
-            </a:r>
-            <a:r>
-              <a:rPr lang="nb-NO" dirty="0" err="1" smtClean="0"/>
-              <a:t>package</a:t>
-            </a:r>
-            <a:r>
-              <a:rPr lang="nb-NO" dirty="0" smtClean="0"/>
-              <a:t> has </a:t>
-            </a:r>
-            <a:r>
-              <a:rPr lang="nb-NO" dirty="0" err="1" smtClean="0"/>
-              <a:t>now</a:t>
-            </a:r>
-            <a:r>
-              <a:rPr lang="nb-NO" dirty="0" smtClean="0"/>
-              <a:t>:</a:t>
-            </a:r>
-          </a:p>
-          <a:p>
-            <a:pPr lvl="1"/>
-            <a:r>
-              <a:rPr lang="nb-NO" dirty="0" err="1" smtClean="0"/>
-              <a:t>installed</a:t>
-            </a:r>
-            <a:r>
-              <a:rPr lang="nb-NO" dirty="0" smtClean="0"/>
-              <a:t> </a:t>
-            </a:r>
-            <a:r>
-              <a:rPr lang="nb-NO" dirty="0" err="1" smtClean="0"/>
-              <a:t>its</a:t>
-            </a:r>
-            <a:r>
-              <a:rPr lang="nb-NO" dirty="0" smtClean="0"/>
-              <a:t> </a:t>
-            </a:r>
-            <a:r>
-              <a:rPr lang="nb-NO" dirty="0" err="1" smtClean="0"/>
-              <a:t>dups</a:t>
-            </a:r>
-            <a:r>
-              <a:rPr lang="nb-NO" dirty="0" smtClean="0"/>
-              <a:t> to $</a:t>
-            </a:r>
-            <a:r>
-              <a:rPr lang="nb-NO" dirty="0" err="1" smtClean="0"/>
-              <a:t>InstallDir</a:t>
-            </a:r>
-            <a:r>
-              <a:rPr lang="nb-NO" dirty="0" smtClean="0"/>
-              <a:t>\$database\</a:t>
-            </a:r>
-            <a:r>
-              <a:rPr lang="nb-NO" dirty="0" err="1" smtClean="0"/>
-              <a:t>dup</a:t>
-            </a:r>
-            <a:r>
-              <a:rPr lang="nb-NO" dirty="0" smtClean="0"/>
-              <a:t> </a:t>
-            </a:r>
-          </a:p>
-          <a:p>
-            <a:pPr lvl="1"/>
-            <a:r>
-              <a:rPr lang="nb-NO" dirty="0" err="1" smtClean="0"/>
-              <a:t>written</a:t>
-            </a:r>
-            <a:r>
-              <a:rPr lang="nb-NO" dirty="0" smtClean="0"/>
-              <a:t> a line in $</a:t>
-            </a:r>
-            <a:r>
-              <a:rPr lang="nb-NO" dirty="0" err="1"/>
-              <a:t>InstallDir</a:t>
-            </a:r>
-            <a:r>
-              <a:rPr lang="nb-NO" dirty="0"/>
-              <a:t>\$database\</a:t>
-            </a:r>
-            <a:r>
-              <a:rPr lang="nb-NO" dirty="0" err="1"/>
-              <a:t>json</a:t>
-            </a:r>
-            <a:r>
-              <a:rPr lang="nb-NO" dirty="0"/>
-              <a:t>\moduleOrder.txt</a:t>
-            </a:r>
-            <a:endParaRPr lang="nb-NO" dirty="0" smtClean="0"/>
-          </a:p>
-          <a:p>
-            <a:pPr lvl="1"/>
-            <a:r>
-              <a:rPr lang="nb-NO" dirty="0" err="1" smtClean="0"/>
-              <a:t>copied</a:t>
-            </a:r>
-            <a:r>
-              <a:rPr lang="nb-NO" dirty="0" smtClean="0"/>
-              <a:t> </a:t>
-            </a:r>
-            <a:r>
-              <a:rPr lang="nb-NO" dirty="0" err="1" smtClean="0"/>
-              <a:t>its</a:t>
-            </a:r>
-            <a:r>
-              <a:rPr lang="nb-NO" dirty="0" smtClean="0"/>
-              <a:t> </a:t>
-            </a:r>
-            <a:r>
-              <a:rPr lang="nb-NO" dirty="0" err="1" smtClean="0"/>
-              <a:t>json</a:t>
-            </a:r>
-            <a:r>
-              <a:rPr lang="nb-NO" dirty="0" smtClean="0"/>
-              <a:t> order file to </a:t>
-            </a:r>
-            <a:r>
-              <a:rPr lang="nb-NO" dirty="0"/>
-              <a:t>$</a:t>
-            </a:r>
-            <a:r>
-              <a:rPr lang="nb-NO" dirty="0" err="1"/>
-              <a:t>InstallDir</a:t>
-            </a:r>
-            <a:r>
-              <a:rPr lang="nb-NO" dirty="0"/>
-              <a:t>\$database\</a:t>
-            </a:r>
-            <a:r>
-              <a:rPr lang="nb-NO" dirty="0" err="1"/>
-              <a:t>json</a:t>
-            </a:r>
-            <a:r>
-              <a:rPr lang="nb-NO" dirty="0" smtClean="0"/>
-              <a:t>\</a:t>
-            </a:r>
-          </a:p>
-          <a:p>
-            <a:pPr marL="514350" indent="-514350">
-              <a:buFont typeface="+mj-lt"/>
-              <a:buAutoNum type="arabicPeriod" startAt="7"/>
-            </a:pPr>
-            <a:r>
-              <a:rPr lang="nb-NO" dirty="0" err="1" smtClean="0"/>
-              <a:t>Creates</a:t>
-            </a:r>
-            <a:r>
-              <a:rPr lang="nb-NO" dirty="0" smtClean="0"/>
-              <a:t> an </a:t>
-            </a:r>
-            <a:r>
-              <a:rPr lang="nb-NO" dirty="0" err="1" smtClean="0"/>
-              <a:t>ordered</a:t>
-            </a:r>
-            <a:r>
-              <a:rPr lang="nb-NO" dirty="0" smtClean="0"/>
-              <a:t> list </a:t>
-            </a:r>
-            <a:r>
-              <a:rPr lang="nb-NO" dirty="0" err="1" smtClean="0"/>
-              <a:t>of</a:t>
-            </a:r>
-            <a:r>
-              <a:rPr lang="nb-NO" dirty="0" smtClean="0"/>
-              <a:t> </a:t>
-            </a:r>
-            <a:r>
-              <a:rPr lang="nb-NO" dirty="0" err="1" smtClean="0"/>
-              <a:t>dupfiles</a:t>
-            </a:r>
-            <a:r>
-              <a:rPr lang="nb-NO" dirty="0" smtClean="0"/>
-              <a:t> </a:t>
-            </a:r>
-            <a:r>
-              <a:rPr lang="nb-NO" dirty="0" err="1" smtClean="0"/>
-              <a:t>based</a:t>
-            </a:r>
-            <a:r>
-              <a:rPr lang="nb-NO" dirty="0" smtClean="0"/>
-              <a:t> </a:t>
-            </a:r>
-            <a:r>
-              <a:rPr lang="nb-NO" dirty="0" err="1" smtClean="0"/>
-              <a:t>on</a:t>
-            </a:r>
-            <a:r>
-              <a:rPr lang="nb-NO" dirty="0" smtClean="0"/>
-              <a:t> all </a:t>
-            </a:r>
-            <a:r>
-              <a:rPr lang="nb-NO" dirty="0" err="1" smtClean="0"/>
-              <a:t>dup-order.json</a:t>
-            </a:r>
-            <a:r>
-              <a:rPr lang="nb-NO" dirty="0" smtClean="0"/>
-              <a:t> files</a:t>
-            </a:r>
-          </a:p>
-          <a:p>
-            <a:pPr marL="514350" indent="-514350">
-              <a:buFont typeface="+mj-lt"/>
-              <a:buAutoNum type="arabicPeriod" startAt="7"/>
-            </a:pPr>
-            <a:r>
-              <a:rPr lang="nb-NO" dirty="0" smtClean="0"/>
-              <a:t>Queries the database to find if all these dupfiles must be executed</a:t>
-            </a:r>
-          </a:p>
-          <a:p>
-            <a:pPr marL="514350" indent="-514350">
-              <a:buFont typeface="+mj-lt"/>
-              <a:buAutoNum type="arabicPeriod" startAt="7"/>
-            </a:pPr>
-            <a:r>
-              <a:rPr lang="nb-NO" dirty="0" smtClean="0"/>
-              <a:t>Executes dup-files using dupconsole and runs dwdba after each dup to generate triggers and views</a:t>
-            </a:r>
-            <a:endParaRPr lang="nb-NO" dirty="0"/>
-          </a:p>
-          <a:p>
-            <a:pPr marL="514350" indent="-514350">
-              <a:buFont typeface="+mj-lt"/>
-              <a:buAutoNum type="arabicPeriod" startAt="7"/>
-            </a:pPr>
-            <a:endParaRPr lang="nb-NO" dirty="0" smtClean="0"/>
-          </a:p>
-        </p:txBody>
-      </p:sp>
-      <p:sp>
-        <p:nvSpPr>
-          <p:cNvPr id="2" name="Title 1"/>
+        </p:nvPicPr>
+        <p:blipFill>
+          <a:blip r:embed="rId2"/>
+          <a:stretch>
+            <a:fillRect/>
+          </a:stretch>
+        </p:blipFill>
+        <p:spPr>
+          <a:xfrm>
+            <a:off x="341274" y="1340769"/>
+            <a:ext cx="5843088" cy="4537075"/>
+          </a:xfrm>
+          <a:prstGeom prst="rect">
+            <a:avLst/>
+          </a:prstGeom>
+        </p:spPr>
+      </p:pic>
+      <p:sp>
+        <p:nvSpPr>
+          <p:cNvPr id="3" name="Title 2"/>
           <p:cNvSpPr>
             <a:spLocks noGrp="1"/>
           </p:cNvSpPr>
@@ -18768,29 +18065,81 @@
           <a:lstStyle/>
           <a:p>
             <a:r>
-              <a:rPr lang="nb-NO" dirty="0" err="1" smtClean="0"/>
-              <a:t>Install-DatabasePackages</a:t>
-            </a:r>
-            <a:r>
-              <a:rPr lang="nb-NO" dirty="0" smtClean="0"/>
-              <a:t> </a:t>
-            </a:r>
-            <a:r>
-              <a:rPr lang="nb-NO" dirty="0" err="1" smtClean="0"/>
-              <a:t>cont</a:t>
-            </a:r>
-            <a:r>
-              <a:rPr lang="nb-NO" dirty="0" smtClean="0"/>
-              <a:t>.</a:t>
+              <a:rPr lang="nb-NO" dirty="0" smtClean="0"/>
+              <a:t>Templates – Package Parameters</a:t>
             </a:r>
             <a:endParaRPr lang="nb-NO" dirty="0"/>
           </a:p>
         </p:txBody>
       </p:sp>
+      <p:pic>
+        <p:nvPicPr>
+          <p:cNvPr id="5" name="Content Placeholder 3"/>
+          <p:cNvPicPr>
+            <a:picLocks noChangeAspect="1"/>
+          </p:cNvPicPr>
+          <p:nvPr/>
+        </p:nvPicPr>
+        <p:blipFill>
+          <a:blip r:embed="rId3"/>
+          <a:stretch>
+            <a:fillRect/>
+          </a:stretch>
+        </p:blipFill>
+        <p:spPr bwMode="auto">
+          <a:xfrm>
+            <a:off x="7969900" y="295361"/>
+            <a:ext cx="3401911" cy="6038240"/>
+          </a:xfrm>
+          <a:prstGeom prst="rect">
+            <a:avLst/>
+          </a:prstGeom>
+          <a:noFill/>
+          <a:ln w="9525">
+            <a:noFill/>
+            <a:miter lim="800000"/>
+            <a:headEnd/>
+            <a:tailEnd/>
+          </a:ln>
+        </p:spPr>
+      </p:pic>
+      <p:cxnSp>
+        <p:nvCxnSpPr>
+          <p:cNvPr id="7" name="Straight Arrow Connector 6"/>
+          <p:cNvCxnSpPr/>
+          <p:nvPr/>
+        </p:nvCxnSpPr>
+        <p:spPr>
+          <a:xfrm>
+            <a:off x="5827222" y="2419004"/>
+            <a:ext cx="1845425" cy="399011"/>
+          </a:xfrm>
+          <a:prstGeom prst="straightConnector1">
+            <a:avLst/>
+          </a:prstGeom>
+          <a:ln>
+            <a:tailEnd type="triangle"/>
+          </a:ln>
+        </p:spPr>
+        <p:style>
+          <a:lnRef idx="1">
+            <a:schemeClr val="accent1"/>
+          </a:lnRef>
+          <a:fillRef idx="0">
+            <a:schemeClr val="accent1"/>
+          </a:fillRef>
+          <a:effectRef idx="0">
+            <a:schemeClr val="accent1"/>
+          </a:effectRef>
+          <a:fontRef idx="minor">
+            <a:schemeClr val="tx1"/>
+          </a:fontRef>
+        </p:style>
+      </p:cxnSp>
     </p:spTree>
     <p:extLst>
       <p:ext uri="{BB962C8B-B14F-4D97-AF65-F5344CB8AC3E}">
-        <p14:creationId xmlns:p14="http://schemas.microsoft.com/office/powerpoint/2010/main" val="2789536597"/>
+        <p14:creationId xmlns:p14="http://schemas.microsoft.com/office/powerpoint/2010/main" val="3281192367"/>
       </p:ext>
     </p:extLst>
   </p:cSld>
@@ -18832,6 +18181,1515 @@
           <a:bodyPr/>
           <a:lstStyle/>
           <a:p>
+            <a:r>
+              <a:rPr lang="nb-NO" dirty="0" smtClean="0"/>
+              <a:t>Chocolatey is not a tool that is designed to be used for database migrations</a:t>
+            </a:r>
+          </a:p>
+          <a:p>
+            <a:r>
+              <a:rPr lang="nb-NO" dirty="0" smtClean="0"/>
+              <a:t>DIPS </a:t>
+            </a:r>
+            <a:r>
+              <a:rPr lang="nb-NO" dirty="0" err="1" smtClean="0"/>
+              <a:t>proprietary</a:t>
+            </a:r>
+            <a:r>
+              <a:rPr lang="nb-NO" dirty="0" smtClean="0"/>
+              <a:t> </a:t>
+            </a:r>
+            <a:r>
+              <a:rPr lang="nb-NO" dirty="0" err="1" smtClean="0"/>
+              <a:t>usage</a:t>
+            </a:r>
+            <a:endParaRPr lang="nb-NO" dirty="0" smtClean="0"/>
+          </a:p>
+          <a:p>
+            <a:r>
+              <a:rPr lang="nb-NO" dirty="0" err="1" smtClean="0"/>
+              <a:t>Choosed</a:t>
+            </a:r>
+            <a:r>
+              <a:rPr lang="nb-NO" dirty="0" smtClean="0"/>
+              <a:t> </a:t>
+            </a:r>
+            <a:r>
+              <a:rPr lang="nb-NO" dirty="0" err="1" smtClean="0"/>
+              <a:t>because</a:t>
+            </a:r>
+            <a:r>
+              <a:rPr lang="nb-NO" dirty="0" smtClean="0"/>
+              <a:t> </a:t>
+            </a:r>
+            <a:r>
+              <a:rPr lang="nb-NO" dirty="0" err="1" smtClean="0"/>
+              <a:t>we</a:t>
+            </a:r>
+            <a:r>
+              <a:rPr lang="nb-NO" dirty="0" smtClean="0"/>
+              <a:t> </a:t>
+            </a:r>
+            <a:r>
+              <a:rPr lang="nb-NO" dirty="0" err="1" smtClean="0"/>
+              <a:t>needed</a:t>
+            </a:r>
+            <a:r>
+              <a:rPr lang="nb-NO" dirty="0" smtClean="0"/>
+              <a:t> </a:t>
+            </a:r>
+            <a:r>
+              <a:rPr lang="nb-NO" dirty="0" err="1" smtClean="0"/>
+              <a:t>something</a:t>
+            </a:r>
+            <a:r>
+              <a:rPr lang="nb-NO" dirty="0" smtClean="0"/>
+              <a:t> </a:t>
+            </a:r>
+            <a:r>
+              <a:rPr lang="nb-NO" dirty="0" err="1" smtClean="0"/>
+              <a:t>that</a:t>
+            </a:r>
+            <a:r>
+              <a:rPr lang="nb-NO" dirty="0" smtClean="0"/>
+              <a:t>:</a:t>
+            </a:r>
+          </a:p>
+          <a:p>
+            <a:pPr lvl="1"/>
+            <a:r>
+              <a:rPr lang="nb-NO" dirty="0" smtClean="0"/>
+              <a:t>Packages upgrade (dupfiles) for each program package (artifacts)</a:t>
+            </a:r>
+          </a:p>
+          <a:p>
+            <a:pPr lvl="1"/>
+            <a:r>
+              <a:rPr lang="nb-NO" dirty="0" smtClean="0"/>
+              <a:t>Handles </a:t>
+            </a:r>
+            <a:r>
+              <a:rPr lang="nb-NO" dirty="0" err="1" smtClean="0"/>
+              <a:t>dependencies</a:t>
+            </a:r>
+            <a:endParaRPr lang="nb-NO" dirty="0" smtClean="0"/>
+          </a:p>
+          <a:p>
+            <a:pPr marL="457200" lvl="1" indent="0">
+              <a:buNone/>
+            </a:pPr>
+            <a:endParaRPr lang="nb-NO" dirty="0"/>
+          </a:p>
+        </p:txBody>
+      </p:sp>
+      <p:sp>
+        <p:nvSpPr>
+          <p:cNvPr id="2" name="Title 1"/>
+          <p:cNvSpPr>
+            <a:spLocks noGrp="1"/>
+          </p:cNvSpPr>
+          <p:nvPr>
+            <p:ph type="title"/>
+          </p:nvPr>
+        </p:nvSpPr>
+        <p:spPr/>
+        <p:txBody>
+          <a:bodyPr/>
+          <a:lstStyle/>
+          <a:p>
+            <a:r>
+              <a:rPr lang="nb-NO" dirty="0" smtClean="0"/>
+              <a:t>Database</a:t>
+            </a:r>
+            <a:endParaRPr lang="nb-NO" dirty="0"/>
+          </a:p>
+        </p:txBody>
+      </p:sp>
+    </p:spTree>
+    <p:extLst>
+      <p:ext uri="{BB962C8B-B14F-4D97-AF65-F5344CB8AC3E}">
+        <p14:creationId xmlns:p14="http://schemas.microsoft.com/office/powerpoint/2010/main" val="1922523215"/>
+      </p:ext>
+    </p:extLst>
+  </p:cSld>
+  <p:clrMapOvr>
+    <a:masterClrMapping/>
+  </p:clrMapOvr>
+</p:sld>
+</file>
+
+<file path=ppt/slides/slide66.xml><?xml version="1.0" encoding="utf-8"?>
+<p:sld xmlns:a="http://schemas.openxmlformats.org/drawingml/2006/main" xmlns:r="http://schemas.openxmlformats.org/officeDocument/2006/relationships" xmlns:p="http://schemas.openxmlformats.org/presentationml/2006/main">
+  <p:cSld>
+    <p:spTree>
+      <p:nvGrpSpPr>
+        <p:cNvPr id="1" name=""/>
+        <p:cNvGrpSpPr/>
+        <p:nvPr/>
+      </p:nvGrpSpPr>
+      <p:grpSpPr>
+        <a:xfrm>
+          <a:off x="0" y="0"/>
+          <a:ext cx="0" cy="0"/>
+          <a:chOff x="0" y="0"/>
+          <a:chExt cx="0" cy="0"/>
+        </a:xfrm>
+      </p:grpSpPr>
+      <p:sp>
+        <p:nvSpPr>
+          <p:cNvPr id="3" name="Content Placeholder 2"/>
+          <p:cNvSpPr>
+            <a:spLocks noGrp="1"/>
+          </p:cNvSpPr>
+          <p:nvPr>
+            <p:ph idx="1"/>
+          </p:nvPr>
+        </p:nvSpPr>
+        <p:spPr/>
+        <p:txBody>
+          <a:bodyPr>
+            <a:normAutofit lnSpcReduction="10000"/>
+          </a:bodyPr>
+          <a:lstStyle/>
+          <a:p>
+            <a:r>
+              <a:rPr lang="nb-NO" dirty="0" smtClean="0"/>
+              <a:t>DIPS Chocolatey packages for database is a highly proprietary and customized solution</a:t>
+            </a:r>
+            <a:endParaRPr lang="nb-NO" dirty="0"/>
+          </a:p>
+          <a:p>
+            <a:r>
+              <a:rPr lang="nb-NO" dirty="0" smtClean="0"/>
+              <a:t>No one else as far as we know uses </a:t>
+            </a:r>
+            <a:r>
+              <a:rPr lang="nb-NO" dirty="0"/>
+              <a:t>C</a:t>
+            </a:r>
+            <a:r>
+              <a:rPr lang="nb-NO" dirty="0" smtClean="0"/>
+              <a:t>hocolatey for database</a:t>
+            </a:r>
+          </a:p>
+          <a:p>
+            <a:r>
+              <a:rPr lang="nb-NO" dirty="0" smtClean="0"/>
+              <a:t>Chocolatey is </a:t>
+            </a:r>
+            <a:r>
+              <a:rPr lang="nb-NO" dirty="0" err="1" smtClean="0"/>
+              <a:t>intended</a:t>
+            </a:r>
+            <a:r>
+              <a:rPr lang="nb-NO" dirty="0" smtClean="0"/>
+              <a:t> for </a:t>
+            </a:r>
+            <a:r>
+              <a:rPr lang="nb-NO" dirty="0" err="1" smtClean="0"/>
+              <a:t>software</a:t>
+            </a:r>
+            <a:r>
+              <a:rPr lang="nb-NO" dirty="0" smtClean="0"/>
+              <a:t> </a:t>
+            </a:r>
+            <a:r>
+              <a:rPr lang="nb-NO" dirty="0" err="1" smtClean="0"/>
+              <a:t>that</a:t>
+            </a:r>
+            <a:r>
+              <a:rPr lang="nb-NO" dirty="0" smtClean="0"/>
+              <a:t> is </a:t>
+            </a:r>
+            <a:r>
+              <a:rPr lang="nb-NO" dirty="0" err="1" smtClean="0"/>
+              <a:t>installed</a:t>
+            </a:r>
+            <a:r>
+              <a:rPr lang="nb-NO" dirty="0" smtClean="0"/>
+              <a:t> to disk, not database</a:t>
+            </a:r>
+          </a:p>
+          <a:p>
+            <a:r>
+              <a:rPr lang="nb-NO" dirty="0">
+                <a:hlinkClick r:id="rId2"/>
+              </a:rPr>
+              <a:t>https://</a:t>
+            </a:r>
+            <a:r>
+              <a:rPr lang="nb-NO" dirty="0" smtClean="0">
+                <a:hlinkClick r:id="rId2"/>
+              </a:rPr>
+              <a:t>wiki/Database-Chocolateypackages</a:t>
+            </a:r>
+            <a:endParaRPr lang="nb-NO" dirty="0" smtClean="0"/>
+          </a:p>
+          <a:p>
+            <a:r>
+              <a:rPr lang="nb-NO" dirty="0" smtClean="0"/>
+              <a:t>Databases </a:t>
+            </a:r>
+            <a:r>
+              <a:rPr lang="nb-NO" dirty="0" err="1" smtClean="0"/>
+              <a:t>cannot</a:t>
+            </a:r>
+            <a:r>
+              <a:rPr lang="nb-NO" dirty="0" smtClean="0"/>
+              <a:t> be </a:t>
+            </a:r>
+            <a:r>
+              <a:rPr lang="nb-NO" dirty="0" err="1" smtClean="0"/>
+              <a:t>upgraded</a:t>
+            </a:r>
+            <a:r>
+              <a:rPr lang="nb-NO" dirty="0" smtClean="0"/>
+              <a:t> by </a:t>
+            </a:r>
+            <a:r>
+              <a:rPr lang="nb-NO" dirty="0" err="1" smtClean="0"/>
+              <a:t>installing</a:t>
+            </a:r>
+            <a:r>
+              <a:rPr lang="nb-NO" dirty="0" smtClean="0"/>
+              <a:t> </a:t>
+            </a:r>
+            <a:r>
+              <a:rPr lang="nb-NO" dirty="0" err="1" smtClean="0"/>
+              <a:t>chocolatey</a:t>
+            </a:r>
+            <a:r>
+              <a:rPr lang="nb-NO" dirty="0" smtClean="0"/>
+              <a:t> </a:t>
+            </a:r>
+            <a:r>
+              <a:rPr lang="nb-NO" dirty="0" err="1" smtClean="0"/>
+              <a:t>packages</a:t>
+            </a:r>
+            <a:r>
+              <a:rPr lang="nb-NO" dirty="0" smtClean="0"/>
+              <a:t> to disk. A custom tool is required to mirror the</a:t>
+            </a:r>
+            <a:r>
+              <a:rPr lang="nb-NO" dirty="0"/>
+              <a:t> </a:t>
+            </a:r>
+            <a:r>
+              <a:rPr lang="nb-NO" dirty="0" smtClean="0"/>
+              <a:t>packages in the database to disk so that </a:t>
+            </a:r>
+            <a:r>
+              <a:rPr lang="nb-NO" dirty="0"/>
+              <a:t>C</a:t>
+            </a:r>
+            <a:r>
+              <a:rPr lang="nb-NO" dirty="0" smtClean="0"/>
+              <a:t>hocolatey can work with it.</a:t>
+            </a:r>
+          </a:p>
+          <a:p>
+            <a:r>
+              <a:rPr lang="nb-NO" dirty="0" err="1" smtClean="0"/>
+              <a:t>Std</a:t>
+            </a:r>
+            <a:r>
+              <a:rPr lang="nb-NO" dirty="0" smtClean="0"/>
+              <a:t> </a:t>
+            </a:r>
+            <a:r>
+              <a:rPr lang="nb-NO" dirty="0" err="1" smtClean="0"/>
+              <a:t>chocolatey</a:t>
+            </a:r>
+            <a:r>
+              <a:rPr lang="nb-NO" dirty="0" smtClean="0"/>
+              <a:t> </a:t>
+            </a:r>
+            <a:r>
+              <a:rPr lang="nb-NO" dirty="0" err="1" smtClean="0"/>
+              <a:t>package</a:t>
+            </a:r>
+            <a:r>
+              <a:rPr lang="nb-NO" dirty="0" smtClean="0"/>
+              <a:t>: </a:t>
+            </a:r>
+            <a:r>
+              <a:rPr lang="nb-NO" dirty="0" err="1" smtClean="0"/>
+              <a:t>dips-dbupgrade</a:t>
+            </a:r>
+            <a:endParaRPr lang="nb-NO" dirty="0"/>
+          </a:p>
+        </p:txBody>
+      </p:sp>
+      <p:sp>
+        <p:nvSpPr>
+          <p:cNvPr id="2" name="Title 1"/>
+          <p:cNvSpPr>
+            <a:spLocks noGrp="1"/>
+          </p:cNvSpPr>
+          <p:nvPr>
+            <p:ph type="title"/>
+          </p:nvPr>
+        </p:nvSpPr>
+        <p:spPr/>
+        <p:txBody>
+          <a:bodyPr/>
+          <a:lstStyle/>
+          <a:p>
+            <a:r>
+              <a:rPr lang="nb-NO" dirty="0" smtClean="0"/>
+              <a:t>Database</a:t>
+            </a:r>
+            <a:endParaRPr lang="nb-NO" dirty="0"/>
+          </a:p>
+        </p:txBody>
+      </p:sp>
+    </p:spTree>
+    <p:extLst>
+      <p:ext uri="{BB962C8B-B14F-4D97-AF65-F5344CB8AC3E}">
+        <p14:creationId xmlns:p14="http://schemas.microsoft.com/office/powerpoint/2010/main" val="3276979433"/>
+      </p:ext>
+    </p:extLst>
+  </p:cSld>
+  <p:clrMapOvr>
+    <a:masterClrMapping/>
+  </p:clrMapOvr>
+</p:sld>
+</file>
+
+<file path=ppt/slides/slide67.xml><?xml version="1.0" encoding="utf-8"?>
+<p:sld xmlns:a="http://schemas.openxmlformats.org/drawingml/2006/main" xmlns:r="http://schemas.openxmlformats.org/officeDocument/2006/relationships" xmlns:p="http://schemas.openxmlformats.org/presentationml/2006/main">
+  <p:cSld>
+    <p:spTree>
+      <p:nvGrpSpPr>
+        <p:cNvPr id="1" name=""/>
+        <p:cNvGrpSpPr/>
+        <p:nvPr/>
+      </p:nvGrpSpPr>
+      <p:grpSpPr>
+        <a:xfrm>
+          <a:off x="0" y="0"/>
+          <a:ext cx="0" cy="0"/>
+          <a:chOff x="0" y="0"/>
+          <a:chExt cx="0" cy="0"/>
+        </a:xfrm>
+      </p:grpSpPr>
+      <p:sp>
+        <p:nvSpPr>
+          <p:cNvPr id="3" name="Content Placeholder 2"/>
+          <p:cNvSpPr>
+            <a:spLocks noGrp="1"/>
+          </p:cNvSpPr>
+          <p:nvPr>
+            <p:ph idx="1"/>
+          </p:nvPr>
+        </p:nvSpPr>
+        <p:spPr/>
+        <p:txBody>
+          <a:bodyPr/>
+          <a:lstStyle/>
+          <a:p>
+            <a:r>
+              <a:rPr lang="nb-NO" dirty="0" err="1" smtClean="0"/>
+              <a:t>Dupfiles</a:t>
+            </a:r>
+            <a:endParaRPr lang="nb-NO" dirty="0" smtClean="0"/>
+          </a:p>
+          <a:p>
+            <a:r>
+              <a:rPr lang="nb-NO" dirty="0" err="1" smtClean="0"/>
+              <a:t>Json</a:t>
+            </a:r>
+            <a:r>
+              <a:rPr lang="nb-NO" dirty="0" smtClean="0"/>
+              <a:t>-file</a:t>
+            </a:r>
+          </a:p>
+          <a:p>
+            <a:r>
+              <a:rPr lang="nb-NO" dirty="0" smtClean="0"/>
+              <a:t>chocolateyInstall.ps1</a:t>
+            </a:r>
+            <a:endParaRPr lang="nb-NO" dirty="0"/>
+          </a:p>
+        </p:txBody>
+      </p:sp>
+      <p:sp>
+        <p:nvSpPr>
+          <p:cNvPr id="2" name="Title 1"/>
+          <p:cNvSpPr>
+            <a:spLocks noGrp="1"/>
+          </p:cNvSpPr>
+          <p:nvPr>
+            <p:ph type="title"/>
+          </p:nvPr>
+        </p:nvSpPr>
+        <p:spPr/>
+        <p:txBody>
+          <a:bodyPr/>
+          <a:lstStyle/>
+          <a:p>
+            <a:r>
+              <a:rPr lang="nb-NO" dirty="0" smtClean="0"/>
+              <a:t>A look at a database Chocolatey package</a:t>
+            </a:r>
+            <a:endParaRPr lang="nb-NO" dirty="0"/>
+          </a:p>
+        </p:txBody>
+      </p:sp>
+    </p:spTree>
+    <p:extLst>
+      <p:ext uri="{BB962C8B-B14F-4D97-AF65-F5344CB8AC3E}">
+        <p14:creationId xmlns:p14="http://schemas.microsoft.com/office/powerpoint/2010/main" val="117989733"/>
+      </p:ext>
+    </p:extLst>
+  </p:cSld>
+  <p:clrMapOvr>
+    <a:masterClrMapping/>
+  </p:clrMapOvr>
+</p:sld>
+</file>
+
+<file path=ppt/slides/slide68.xml><?xml version="1.0" encoding="utf-8"?>
+<p:sld xmlns:a="http://schemas.openxmlformats.org/drawingml/2006/main" xmlns:r="http://schemas.openxmlformats.org/officeDocument/2006/relationships" xmlns:p="http://schemas.openxmlformats.org/presentationml/2006/main">
+  <p:cSld>
+    <p:spTree>
+      <p:nvGrpSpPr>
+        <p:cNvPr id="1" name=""/>
+        <p:cNvGrpSpPr/>
+        <p:nvPr/>
+      </p:nvGrpSpPr>
+      <p:grpSpPr>
+        <a:xfrm>
+          <a:off x="0" y="0"/>
+          <a:ext cx="0" cy="0"/>
+          <a:chOff x="0" y="0"/>
+          <a:chExt cx="0" cy="0"/>
+        </a:xfrm>
+      </p:grpSpPr>
+      <p:sp>
+        <p:nvSpPr>
+          <p:cNvPr id="3" name="Content Placeholder 2"/>
+          <p:cNvSpPr>
+            <a:spLocks noGrp="1"/>
+          </p:cNvSpPr>
+          <p:nvPr>
+            <p:ph idx="1"/>
+          </p:nvPr>
+        </p:nvSpPr>
+        <p:spPr/>
+        <p:txBody>
+          <a:bodyPr/>
+          <a:lstStyle/>
+          <a:p>
+            <a:r>
+              <a:rPr lang="nb-NO" dirty="0" smtClean="0"/>
+              <a:t>dips-dbupgrade is a Chocolatey package that installs a powershell module named DIPSDBupgrade.</a:t>
+            </a:r>
+          </a:p>
+          <a:p>
+            <a:r>
+              <a:rPr lang="nb-NO" dirty="0" smtClean="0"/>
+              <a:t>The </a:t>
+            </a:r>
+            <a:r>
+              <a:rPr lang="nb-NO" dirty="0" err="1" smtClean="0"/>
+              <a:t>module</a:t>
+            </a:r>
+            <a:r>
+              <a:rPr lang="nb-NO" dirty="0" smtClean="0"/>
+              <a:t> </a:t>
+            </a:r>
+            <a:r>
+              <a:rPr lang="nb-NO" dirty="0" err="1" smtClean="0"/>
+              <a:t>contains</a:t>
+            </a:r>
+            <a:r>
+              <a:rPr lang="nb-NO" dirty="0" smtClean="0"/>
+              <a:t> </a:t>
+            </a:r>
+            <a:r>
+              <a:rPr lang="nb-NO" dirty="0" err="1" smtClean="0"/>
+              <a:t>the</a:t>
+            </a:r>
+            <a:r>
+              <a:rPr lang="nb-NO" dirty="0" smtClean="0"/>
+              <a:t> </a:t>
+            </a:r>
+            <a:r>
+              <a:rPr lang="nb-NO" dirty="0" err="1" smtClean="0"/>
+              <a:t>function</a:t>
+            </a:r>
+            <a:r>
+              <a:rPr lang="nb-NO" dirty="0" smtClean="0"/>
+              <a:t>: </a:t>
+            </a:r>
+            <a:r>
+              <a:rPr lang="nb-NO" dirty="0" err="1" smtClean="0"/>
+              <a:t>Install-Databasepackages</a:t>
+            </a:r>
+            <a:endParaRPr lang="nb-NO" dirty="0" smtClean="0"/>
+          </a:p>
+          <a:p>
+            <a:endParaRPr lang="nb-NO" dirty="0"/>
+          </a:p>
+          <a:p>
+            <a:r>
+              <a:rPr lang="nb-NO" dirty="0" err="1" smtClean="0"/>
+              <a:t>Install-DatabasePackages</a:t>
+            </a:r>
+            <a:r>
+              <a:rPr lang="nb-NO" dirty="0" smtClean="0"/>
+              <a:t> –</a:t>
+            </a:r>
+            <a:r>
+              <a:rPr lang="nb-NO" dirty="0" err="1" smtClean="0"/>
+              <a:t>Packages</a:t>
+            </a:r>
+            <a:r>
+              <a:rPr lang="nb-NO" dirty="0" smtClean="0"/>
+              <a:t> </a:t>
+            </a:r>
+            <a:r>
+              <a:rPr lang="nb-NO" dirty="0" err="1" smtClean="0"/>
+              <a:t>packageId</a:t>
+            </a:r>
+            <a:r>
+              <a:rPr lang="nb-NO" dirty="0" smtClean="0"/>
+              <a:t> –Source c:\temp –Database vd-dbbuild10/</a:t>
+            </a:r>
+            <a:r>
+              <a:rPr lang="nb-NO" dirty="0" err="1" smtClean="0"/>
+              <a:t>dips</a:t>
+            </a:r>
+            <a:r>
+              <a:rPr lang="nb-NO" dirty="0" smtClean="0"/>
+              <a:t> –</a:t>
+            </a:r>
+            <a:r>
+              <a:rPr lang="nb-NO" dirty="0" err="1" smtClean="0"/>
+              <a:t>InstallDir</a:t>
+            </a:r>
+            <a:r>
+              <a:rPr lang="nb-NO" dirty="0" smtClean="0"/>
+              <a:t> c:\temp –</a:t>
+            </a:r>
+            <a:r>
+              <a:rPr lang="nb-NO" dirty="0" err="1" smtClean="0"/>
+              <a:t>Password</a:t>
+            </a:r>
+            <a:r>
+              <a:rPr lang="nb-NO" dirty="0" smtClean="0"/>
+              <a:t> </a:t>
+            </a:r>
+            <a:r>
+              <a:rPr lang="nb-NO" dirty="0" err="1" smtClean="0"/>
+              <a:t>oracle</a:t>
+            </a:r>
+            <a:endParaRPr lang="nb-NO" dirty="0"/>
+          </a:p>
+        </p:txBody>
+      </p:sp>
+      <p:sp>
+        <p:nvSpPr>
+          <p:cNvPr id="2" name="Title 1"/>
+          <p:cNvSpPr>
+            <a:spLocks noGrp="1"/>
+          </p:cNvSpPr>
+          <p:nvPr>
+            <p:ph type="title"/>
+          </p:nvPr>
+        </p:nvSpPr>
+        <p:spPr/>
+        <p:txBody>
+          <a:bodyPr/>
+          <a:lstStyle/>
+          <a:p>
+            <a:r>
+              <a:rPr lang="nb-NO" dirty="0" err="1" smtClean="0"/>
+              <a:t>dips-dbupgrade</a:t>
+            </a:r>
+            <a:endParaRPr lang="nb-NO" dirty="0"/>
+          </a:p>
+        </p:txBody>
+      </p:sp>
+    </p:spTree>
+    <p:extLst>
+      <p:ext uri="{BB962C8B-B14F-4D97-AF65-F5344CB8AC3E}">
+        <p14:creationId xmlns:p14="http://schemas.microsoft.com/office/powerpoint/2010/main" val="3039931082"/>
+      </p:ext>
+    </p:extLst>
+  </p:cSld>
+  <p:clrMapOvr>
+    <a:masterClrMapping/>
+  </p:clrMapOvr>
+</p:sld>
+</file>
+
+<file path=ppt/slides/slide69.xml><?xml version="1.0" encoding="utf-8"?>
+<p:sld xmlns:a="http://schemas.openxmlformats.org/drawingml/2006/main" xmlns:r="http://schemas.openxmlformats.org/officeDocument/2006/relationships" xmlns:p="http://schemas.openxmlformats.org/presentationml/2006/main">
+  <p:cSld>
+    <p:spTree>
+      <p:nvGrpSpPr>
+        <p:cNvPr id="1" name=""/>
+        <p:cNvGrpSpPr/>
+        <p:nvPr/>
+      </p:nvGrpSpPr>
+      <p:grpSpPr>
+        <a:xfrm>
+          <a:off x="0" y="0"/>
+          <a:ext cx="0" cy="0"/>
+          <a:chOff x="0" y="0"/>
+          <a:chExt cx="0" cy="0"/>
+        </a:xfrm>
+      </p:grpSpPr>
+      <p:sp>
+        <p:nvSpPr>
+          <p:cNvPr id="3" name="Content Placeholder 2"/>
+          <p:cNvSpPr>
+            <a:spLocks noGrp="1"/>
+          </p:cNvSpPr>
+          <p:nvPr>
+            <p:ph idx="1"/>
+          </p:nvPr>
+        </p:nvSpPr>
+        <p:spPr/>
+        <p:txBody>
+          <a:bodyPr>
+            <a:normAutofit lnSpcReduction="10000"/>
+          </a:bodyPr>
+          <a:lstStyle/>
+          <a:p>
+            <a:pPr marL="514350" indent="-514350">
+              <a:buFont typeface="+mj-lt"/>
+              <a:buAutoNum type="arabicPeriod"/>
+            </a:pPr>
+            <a:r>
+              <a:rPr lang="nb-NO" dirty="0" smtClean="0"/>
+              <a:t>Tests </a:t>
+            </a:r>
+            <a:r>
+              <a:rPr lang="nb-NO" dirty="0" err="1" smtClean="0"/>
+              <a:t>that</a:t>
+            </a:r>
+            <a:r>
+              <a:rPr lang="nb-NO" dirty="0" smtClean="0"/>
+              <a:t> </a:t>
+            </a:r>
+            <a:r>
+              <a:rPr lang="nb-NO" dirty="0" err="1" smtClean="0"/>
+              <a:t>the</a:t>
+            </a:r>
+            <a:r>
+              <a:rPr lang="nb-NO" dirty="0" smtClean="0"/>
+              <a:t> </a:t>
+            </a:r>
+            <a:r>
+              <a:rPr lang="nb-NO" dirty="0" err="1" smtClean="0"/>
+              <a:t>specified</a:t>
+            </a:r>
+            <a:r>
+              <a:rPr lang="nb-NO" dirty="0" smtClean="0"/>
+              <a:t> database </a:t>
+            </a:r>
+            <a:r>
+              <a:rPr lang="nb-NO" dirty="0" err="1" smtClean="0"/>
+              <a:t>can</a:t>
+            </a:r>
+            <a:r>
+              <a:rPr lang="nb-NO" dirty="0" smtClean="0"/>
+              <a:t> be </a:t>
+            </a:r>
+            <a:r>
+              <a:rPr lang="nb-NO" dirty="0" err="1" smtClean="0"/>
+              <a:t>connected</a:t>
+            </a:r>
+            <a:r>
+              <a:rPr lang="nb-NO" dirty="0" smtClean="0"/>
+              <a:t> to and </a:t>
+            </a:r>
+            <a:r>
+              <a:rPr lang="nb-NO" dirty="0" err="1" smtClean="0"/>
+              <a:t>that</a:t>
+            </a:r>
+            <a:r>
+              <a:rPr lang="nb-NO" dirty="0" smtClean="0"/>
+              <a:t> it is a DIPS database (</a:t>
+            </a:r>
+            <a:r>
+              <a:rPr lang="nb-NO" dirty="0" err="1" smtClean="0"/>
+              <a:t>i.e</a:t>
+            </a:r>
+            <a:r>
+              <a:rPr lang="nb-NO" dirty="0" smtClean="0"/>
+              <a:t> not a </a:t>
+            </a:r>
+            <a:r>
+              <a:rPr lang="nb-NO" dirty="0" err="1" smtClean="0"/>
+              <a:t>datamart</a:t>
+            </a:r>
+            <a:r>
+              <a:rPr lang="nb-NO" dirty="0" smtClean="0"/>
+              <a:t>)</a:t>
+            </a:r>
+          </a:p>
+          <a:p>
+            <a:pPr marL="514350" indent="-514350">
+              <a:buFont typeface="+mj-lt"/>
+              <a:buAutoNum type="arabicPeriod"/>
+            </a:pPr>
+            <a:r>
+              <a:rPr lang="nb-NO" dirty="0" err="1" smtClean="0"/>
+              <a:t>Executes</a:t>
+            </a:r>
+            <a:r>
+              <a:rPr lang="nb-NO" dirty="0" smtClean="0"/>
+              <a:t> </a:t>
+            </a:r>
+            <a:r>
+              <a:rPr lang="nb-NO" dirty="0" err="1" smtClean="0"/>
+              <a:t>prerequsites</a:t>
+            </a:r>
+            <a:r>
+              <a:rPr lang="nb-NO" dirty="0" smtClean="0"/>
+              <a:t> tests (</a:t>
+            </a:r>
+            <a:r>
+              <a:rPr lang="nb-NO" dirty="0" err="1" smtClean="0"/>
+              <a:t>dupconsole</a:t>
+            </a:r>
+            <a:r>
+              <a:rPr lang="nb-NO" dirty="0" smtClean="0"/>
+              <a:t>, </a:t>
+            </a:r>
+            <a:r>
+              <a:rPr lang="nb-NO" dirty="0" err="1" smtClean="0"/>
+              <a:t>path</a:t>
+            </a:r>
+            <a:r>
+              <a:rPr lang="nb-NO" dirty="0" smtClean="0"/>
+              <a:t>)</a:t>
+            </a:r>
+          </a:p>
+          <a:p>
+            <a:pPr marL="514350" indent="-514350">
+              <a:buFont typeface="+mj-lt"/>
+              <a:buAutoNum type="arabicPeriod"/>
+            </a:pPr>
+            <a:r>
+              <a:rPr lang="nb-NO" dirty="0" err="1" smtClean="0"/>
+              <a:t>Creates</a:t>
+            </a:r>
+            <a:r>
+              <a:rPr lang="nb-NO" dirty="0" smtClean="0"/>
+              <a:t> a </a:t>
+            </a:r>
+            <a:r>
+              <a:rPr lang="nb-NO" dirty="0" err="1" smtClean="0"/>
+              <a:t>new</a:t>
+            </a:r>
+            <a:r>
+              <a:rPr lang="nb-NO" dirty="0" smtClean="0"/>
+              <a:t> folder </a:t>
+            </a:r>
+            <a:r>
+              <a:rPr lang="nb-NO" dirty="0" err="1" smtClean="0"/>
+              <a:t>inside</a:t>
+            </a:r>
+            <a:r>
+              <a:rPr lang="nb-NO" dirty="0" smtClean="0"/>
+              <a:t> </a:t>
+            </a:r>
+            <a:r>
+              <a:rPr lang="nb-NO" dirty="0" err="1" smtClean="0"/>
+              <a:t>installDir</a:t>
+            </a:r>
+            <a:r>
+              <a:rPr lang="nb-NO" dirty="0" smtClean="0"/>
+              <a:t>: vd-dbbuild10-dips-20190610-101010</a:t>
+            </a:r>
+          </a:p>
+          <a:p>
+            <a:pPr marL="514350" indent="-514350">
+              <a:buFont typeface="+mj-lt"/>
+              <a:buAutoNum type="arabicPeriod"/>
+            </a:pPr>
+            <a:r>
+              <a:rPr lang="nb-NO" dirty="0" smtClean="0"/>
+              <a:t>Sets </a:t>
+            </a:r>
+            <a:r>
+              <a:rPr lang="nb-NO" dirty="0"/>
+              <a:t>C</a:t>
+            </a:r>
+            <a:r>
+              <a:rPr lang="nb-NO" dirty="0" smtClean="0"/>
+              <a:t>hocolatey to work with this directory as its working directory (i.e. like a </a:t>
+            </a:r>
+            <a:r>
+              <a:rPr lang="nb-NO" dirty="0" err="1" smtClean="0"/>
+              <a:t>clean</a:t>
+            </a:r>
+            <a:r>
+              <a:rPr lang="nb-NO" dirty="0" smtClean="0"/>
+              <a:t> </a:t>
+            </a:r>
+            <a:r>
+              <a:rPr lang="nb-NO" dirty="0" err="1" smtClean="0"/>
+              <a:t>machine</a:t>
+            </a:r>
+            <a:r>
+              <a:rPr lang="nb-NO" dirty="0" smtClean="0"/>
+              <a:t>)</a:t>
+            </a:r>
+          </a:p>
+          <a:p>
+            <a:pPr marL="514350" indent="-514350">
+              <a:buFont typeface="+mj-lt"/>
+              <a:buAutoNum type="arabicPeriod"/>
+            </a:pPr>
+            <a:r>
+              <a:rPr lang="nb-NO" dirty="0" smtClean="0"/>
+              <a:t>Queries the database for all installed packages</a:t>
+            </a:r>
+          </a:p>
+          <a:p>
+            <a:pPr marL="514350" indent="-514350">
+              <a:buFont typeface="+mj-lt"/>
+              <a:buAutoNum type="arabicPeriod"/>
+            </a:pPr>
+            <a:r>
+              <a:rPr lang="nb-NO" dirty="0" err="1" smtClean="0"/>
+              <a:t>Creates</a:t>
+            </a:r>
+            <a:r>
+              <a:rPr lang="nb-NO" dirty="0" smtClean="0"/>
+              <a:t> a </a:t>
+            </a:r>
+            <a:r>
+              <a:rPr lang="nb-NO" dirty="0" err="1" smtClean="0"/>
+              <a:t>representation</a:t>
+            </a:r>
+            <a:r>
+              <a:rPr lang="nb-NO" dirty="0" smtClean="0"/>
+              <a:t> </a:t>
+            </a:r>
+            <a:r>
+              <a:rPr lang="nb-NO" dirty="0" err="1" smtClean="0"/>
+              <a:t>of</a:t>
+            </a:r>
+            <a:r>
+              <a:rPr lang="nb-NO" dirty="0" smtClean="0"/>
+              <a:t> all </a:t>
+            </a:r>
+            <a:r>
+              <a:rPr lang="nb-NO" dirty="0" err="1" smtClean="0"/>
+              <a:t>the</a:t>
+            </a:r>
+            <a:r>
+              <a:rPr lang="nb-NO" dirty="0" smtClean="0"/>
+              <a:t> </a:t>
+            </a:r>
+            <a:r>
+              <a:rPr lang="nb-NO" dirty="0" err="1" smtClean="0"/>
+              <a:t>packages</a:t>
+            </a:r>
+            <a:r>
+              <a:rPr lang="nb-NO" dirty="0" smtClean="0"/>
+              <a:t> in </a:t>
+            </a:r>
+            <a:r>
+              <a:rPr lang="nb-NO" dirty="0" err="1" smtClean="0"/>
+              <a:t>the</a:t>
+            </a:r>
+            <a:r>
+              <a:rPr lang="nb-NO" dirty="0" smtClean="0"/>
+              <a:t> database in :$</a:t>
+            </a:r>
+            <a:r>
+              <a:rPr lang="nb-NO" dirty="0" err="1" smtClean="0"/>
+              <a:t>InstallDir</a:t>
+            </a:r>
+            <a:r>
+              <a:rPr lang="nb-NO" dirty="0" smtClean="0"/>
+              <a:t>\database-date-time\</a:t>
+            </a:r>
+            <a:r>
+              <a:rPr lang="nb-NO" dirty="0" err="1" smtClean="0"/>
+              <a:t>choco</a:t>
+            </a:r>
+            <a:r>
+              <a:rPr lang="nb-NO" dirty="0" smtClean="0"/>
+              <a:t>\</a:t>
+            </a:r>
+            <a:r>
+              <a:rPr lang="nb-NO" dirty="0" err="1" smtClean="0"/>
+              <a:t>chocolatey</a:t>
+            </a:r>
+            <a:r>
+              <a:rPr lang="nb-NO" dirty="0" smtClean="0"/>
+              <a:t>\</a:t>
+            </a:r>
+            <a:r>
+              <a:rPr lang="nb-NO" dirty="0" err="1" smtClean="0"/>
+              <a:t>lib</a:t>
+            </a:r>
+            <a:endParaRPr lang="nb-NO" dirty="0" smtClean="0"/>
+          </a:p>
+          <a:p>
+            <a:pPr marL="514350" indent="-514350">
+              <a:buFont typeface="+mj-lt"/>
+              <a:buAutoNum type="arabicPeriod"/>
+            </a:pPr>
+            <a:endParaRPr lang="nb-NO" dirty="0"/>
+          </a:p>
+        </p:txBody>
+      </p:sp>
+      <p:sp>
+        <p:nvSpPr>
+          <p:cNvPr id="2" name="Title 1"/>
+          <p:cNvSpPr>
+            <a:spLocks noGrp="1"/>
+          </p:cNvSpPr>
+          <p:nvPr>
+            <p:ph type="title"/>
+          </p:nvPr>
+        </p:nvSpPr>
+        <p:spPr/>
+        <p:txBody>
+          <a:bodyPr/>
+          <a:lstStyle/>
+          <a:p>
+            <a:r>
+              <a:rPr lang="nb-NO" dirty="0" err="1" smtClean="0"/>
+              <a:t>Install-DatabasePackages</a:t>
+            </a:r>
+            <a:endParaRPr lang="nb-NO" dirty="0"/>
+          </a:p>
+        </p:txBody>
+      </p:sp>
+    </p:spTree>
+    <p:extLst>
+      <p:ext uri="{BB962C8B-B14F-4D97-AF65-F5344CB8AC3E}">
+        <p14:creationId xmlns:p14="http://schemas.microsoft.com/office/powerpoint/2010/main" val="1604630973"/>
+      </p:ext>
+    </p:extLst>
+  </p:cSld>
+  <p:clrMapOvr>
+    <a:masterClrMapping/>
+  </p:clrMapOvr>
+</p:sld>
+</file>
+
+<file path=ppt/slides/slide7.xml><?xml version="1.0" encoding="utf-8"?>
+<p:sld xmlns:a="http://schemas.openxmlformats.org/drawingml/2006/main" xmlns:r="http://schemas.openxmlformats.org/officeDocument/2006/relationships" xmlns:p="http://schemas.openxmlformats.org/presentationml/2006/main">
+  <p:cSld>
+    <p:spTree>
+      <p:nvGrpSpPr>
+        <p:cNvPr id="1" name=""/>
+        <p:cNvGrpSpPr/>
+        <p:nvPr/>
+      </p:nvGrpSpPr>
+      <p:grpSpPr>
+        <a:xfrm>
+          <a:off x="0" y="0"/>
+          <a:ext cx="0" cy="0"/>
+          <a:chOff x="0" y="0"/>
+          <a:chExt cx="0" cy="0"/>
+        </a:xfrm>
+      </p:grpSpPr>
+      <p:sp>
+        <p:nvSpPr>
+          <p:cNvPr id="3" name="Content Placeholder 2"/>
+          <p:cNvSpPr>
+            <a:spLocks noGrp="1"/>
+          </p:cNvSpPr>
+          <p:nvPr>
+            <p:ph idx="1"/>
+          </p:nvPr>
+        </p:nvSpPr>
+        <p:spPr/>
+        <p:txBody>
+          <a:bodyPr/>
+          <a:lstStyle/>
+          <a:p>
+            <a:endParaRPr lang="nb-NO" dirty="0" smtClean="0"/>
+          </a:p>
+          <a:p>
+            <a:endParaRPr lang="nb-NO" dirty="0"/>
+          </a:p>
+          <a:p>
+            <a:endParaRPr lang="nb-NO" dirty="0"/>
+          </a:p>
+        </p:txBody>
+      </p:sp>
+      <p:sp>
+        <p:nvSpPr>
+          <p:cNvPr id="2" name="Title 1"/>
+          <p:cNvSpPr>
+            <a:spLocks noGrp="1"/>
+          </p:cNvSpPr>
+          <p:nvPr>
+            <p:ph type="title"/>
+          </p:nvPr>
+        </p:nvSpPr>
+        <p:spPr/>
+        <p:txBody>
+          <a:bodyPr/>
+          <a:lstStyle/>
+          <a:p>
+            <a:r>
+              <a:rPr lang="nb-NO" dirty="0" smtClean="0"/>
+              <a:t>Manual IIS </a:t>
+            </a:r>
+            <a:r>
+              <a:rPr lang="nb-NO" dirty="0" err="1" smtClean="0"/>
+              <a:t>configuration</a:t>
+            </a:r>
+            <a:endParaRPr lang="nb-NO" dirty="0"/>
+          </a:p>
+        </p:txBody>
+      </p:sp>
+      <p:pic>
+        <p:nvPicPr>
+          <p:cNvPr id="4" name="Picture 3"/>
+          <p:cNvPicPr>
+            <a:picLocks noChangeAspect="1"/>
+          </p:cNvPicPr>
+          <p:nvPr/>
+        </p:nvPicPr>
+        <p:blipFill>
+          <a:blip r:embed="rId2"/>
+          <a:stretch>
+            <a:fillRect/>
+          </a:stretch>
+        </p:blipFill>
+        <p:spPr>
+          <a:xfrm>
+            <a:off x="2801562" y="2181398"/>
+            <a:ext cx="4743450" cy="4191000"/>
+          </a:xfrm>
+          <a:prstGeom prst="rect">
+            <a:avLst/>
+          </a:prstGeom>
+        </p:spPr>
+      </p:pic>
+    </p:spTree>
+    <p:extLst>
+      <p:ext uri="{BB962C8B-B14F-4D97-AF65-F5344CB8AC3E}">
+        <p14:creationId xmlns:p14="http://schemas.microsoft.com/office/powerpoint/2010/main" val="70904891"/>
+      </p:ext>
+    </p:extLst>
+  </p:cSld>
+  <p:clrMapOvr>
+    <a:masterClrMapping/>
+  </p:clrMapOvr>
+</p:sld>
+</file>
+
+<file path=ppt/slides/slide70.xml><?xml version="1.0" encoding="utf-8"?>
+<p:sld xmlns:a="http://schemas.openxmlformats.org/drawingml/2006/main" xmlns:r="http://schemas.openxmlformats.org/officeDocument/2006/relationships" xmlns:p="http://schemas.openxmlformats.org/presentationml/2006/main">
+  <p:cSld>
+    <p:spTree>
+      <p:nvGrpSpPr>
+        <p:cNvPr id="1" name=""/>
+        <p:cNvGrpSpPr/>
+        <p:nvPr/>
+      </p:nvGrpSpPr>
+      <p:grpSpPr>
+        <a:xfrm>
+          <a:off x="0" y="0"/>
+          <a:ext cx="0" cy="0"/>
+          <a:chOff x="0" y="0"/>
+          <a:chExt cx="0" cy="0"/>
+        </a:xfrm>
+      </p:grpSpPr>
+      <p:sp>
+        <p:nvSpPr>
+          <p:cNvPr id="3" name="Content Placeholder 2"/>
+          <p:cNvSpPr>
+            <a:spLocks noGrp="1"/>
+          </p:cNvSpPr>
+          <p:nvPr>
+            <p:ph idx="1"/>
+          </p:nvPr>
+        </p:nvSpPr>
+        <p:spPr/>
+        <p:txBody>
+          <a:bodyPr>
+            <a:normAutofit/>
+          </a:bodyPr>
+          <a:lstStyle/>
+          <a:p>
+            <a:pPr marL="514350" indent="-514350">
+              <a:buFont typeface="+mj-lt"/>
+              <a:buAutoNum type="arabicPeriod" startAt="7"/>
+            </a:pPr>
+            <a:r>
+              <a:rPr lang="nb-NO" dirty="0" err="1" smtClean="0"/>
+              <a:t>Installs</a:t>
+            </a:r>
+            <a:r>
+              <a:rPr lang="nb-NO" dirty="0" smtClean="0"/>
+              <a:t> </a:t>
+            </a:r>
+            <a:r>
+              <a:rPr lang="nb-NO" dirty="0" err="1"/>
+              <a:t>packages</a:t>
+            </a:r>
+            <a:r>
+              <a:rPr lang="nb-NO" dirty="0"/>
+              <a:t> </a:t>
+            </a:r>
+            <a:r>
+              <a:rPr lang="nb-NO" dirty="0" err="1"/>
+              <a:t>into</a:t>
+            </a:r>
+            <a:r>
+              <a:rPr lang="nb-NO" dirty="0"/>
+              <a:t> :$</a:t>
+            </a:r>
+            <a:r>
+              <a:rPr lang="nb-NO" dirty="0" err="1" smtClean="0"/>
+              <a:t>InstallDir</a:t>
+            </a:r>
+            <a:r>
+              <a:rPr lang="nb-NO" dirty="0" smtClean="0"/>
+              <a:t>\database-date-time\</a:t>
+            </a:r>
+            <a:r>
+              <a:rPr lang="nb-NO" dirty="0" err="1" smtClean="0"/>
+              <a:t>choco</a:t>
+            </a:r>
+            <a:r>
+              <a:rPr lang="nb-NO" dirty="0" smtClean="0"/>
+              <a:t>\</a:t>
+            </a:r>
+            <a:r>
+              <a:rPr lang="nb-NO" dirty="0" err="1" smtClean="0"/>
+              <a:t>lib</a:t>
+            </a:r>
+            <a:endParaRPr lang="nb-NO" dirty="0"/>
+          </a:p>
+          <a:p>
+            <a:pPr marL="514350" indent="-514350">
+              <a:buFont typeface="+mj-lt"/>
+              <a:buAutoNum type="arabicPeriod" startAt="7"/>
+            </a:pPr>
+            <a:r>
+              <a:rPr lang="nb-NO" dirty="0" err="1" smtClean="0"/>
+              <a:t>Each</a:t>
+            </a:r>
+            <a:r>
+              <a:rPr lang="nb-NO" dirty="0" smtClean="0"/>
+              <a:t> </a:t>
+            </a:r>
+            <a:r>
+              <a:rPr lang="nb-NO" dirty="0" err="1" smtClean="0"/>
+              <a:t>package</a:t>
+            </a:r>
+            <a:r>
+              <a:rPr lang="nb-NO" dirty="0" smtClean="0"/>
+              <a:t> has </a:t>
+            </a:r>
+            <a:r>
+              <a:rPr lang="nb-NO" dirty="0" err="1" smtClean="0"/>
+              <a:t>now</a:t>
+            </a:r>
+            <a:r>
+              <a:rPr lang="nb-NO" dirty="0" smtClean="0"/>
+              <a:t>:</a:t>
+            </a:r>
+          </a:p>
+          <a:p>
+            <a:pPr lvl="1"/>
+            <a:r>
+              <a:rPr lang="nb-NO" dirty="0" err="1" smtClean="0"/>
+              <a:t>installed</a:t>
+            </a:r>
+            <a:r>
+              <a:rPr lang="nb-NO" dirty="0" smtClean="0"/>
+              <a:t> </a:t>
+            </a:r>
+            <a:r>
+              <a:rPr lang="nb-NO" dirty="0" err="1" smtClean="0"/>
+              <a:t>its</a:t>
+            </a:r>
+            <a:r>
+              <a:rPr lang="nb-NO" dirty="0" smtClean="0"/>
+              <a:t> </a:t>
+            </a:r>
+            <a:r>
+              <a:rPr lang="nb-NO" dirty="0" err="1" smtClean="0"/>
+              <a:t>dups</a:t>
+            </a:r>
+            <a:r>
+              <a:rPr lang="nb-NO" dirty="0" smtClean="0"/>
+              <a:t> to $</a:t>
+            </a:r>
+            <a:r>
+              <a:rPr lang="nb-NO" dirty="0" err="1" smtClean="0"/>
+              <a:t>InstallDir</a:t>
+            </a:r>
+            <a:r>
+              <a:rPr lang="nb-NO" dirty="0" smtClean="0"/>
+              <a:t>\$database\</a:t>
+            </a:r>
+            <a:r>
+              <a:rPr lang="nb-NO" dirty="0" err="1" smtClean="0"/>
+              <a:t>dup</a:t>
+            </a:r>
+            <a:r>
+              <a:rPr lang="nb-NO" dirty="0" smtClean="0"/>
+              <a:t> </a:t>
+            </a:r>
+          </a:p>
+          <a:p>
+            <a:pPr lvl="1"/>
+            <a:r>
+              <a:rPr lang="nb-NO" dirty="0" err="1" smtClean="0"/>
+              <a:t>written</a:t>
+            </a:r>
+            <a:r>
+              <a:rPr lang="nb-NO" dirty="0" smtClean="0"/>
+              <a:t> a line in $</a:t>
+            </a:r>
+            <a:r>
+              <a:rPr lang="nb-NO" dirty="0" err="1"/>
+              <a:t>InstallDir</a:t>
+            </a:r>
+            <a:r>
+              <a:rPr lang="nb-NO" dirty="0"/>
+              <a:t>\$database\</a:t>
+            </a:r>
+            <a:r>
+              <a:rPr lang="nb-NO" dirty="0" err="1"/>
+              <a:t>json</a:t>
+            </a:r>
+            <a:r>
+              <a:rPr lang="nb-NO" dirty="0"/>
+              <a:t>\moduleOrder.txt</a:t>
+            </a:r>
+            <a:endParaRPr lang="nb-NO" dirty="0" smtClean="0"/>
+          </a:p>
+          <a:p>
+            <a:pPr lvl="1"/>
+            <a:r>
+              <a:rPr lang="nb-NO" dirty="0" err="1" smtClean="0"/>
+              <a:t>copied</a:t>
+            </a:r>
+            <a:r>
+              <a:rPr lang="nb-NO" dirty="0" smtClean="0"/>
+              <a:t> </a:t>
+            </a:r>
+            <a:r>
+              <a:rPr lang="nb-NO" dirty="0" err="1" smtClean="0"/>
+              <a:t>its</a:t>
+            </a:r>
+            <a:r>
+              <a:rPr lang="nb-NO" dirty="0" smtClean="0"/>
+              <a:t> </a:t>
+            </a:r>
+            <a:r>
+              <a:rPr lang="nb-NO" dirty="0" err="1" smtClean="0"/>
+              <a:t>json</a:t>
+            </a:r>
+            <a:r>
+              <a:rPr lang="nb-NO" dirty="0" smtClean="0"/>
+              <a:t> order file to </a:t>
+            </a:r>
+            <a:r>
+              <a:rPr lang="nb-NO" dirty="0"/>
+              <a:t>$</a:t>
+            </a:r>
+            <a:r>
+              <a:rPr lang="nb-NO" dirty="0" err="1"/>
+              <a:t>InstallDir</a:t>
+            </a:r>
+            <a:r>
+              <a:rPr lang="nb-NO" dirty="0"/>
+              <a:t>\$database\</a:t>
+            </a:r>
+            <a:r>
+              <a:rPr lang="nb-NO" dirty="0" err="1"/>
+              <a:t>json</a:t>
+            </a:r>
+            <a:r>
+              <a:rPr lang="nb-NO" dirty="0" smtClean="0"/>
+              <a:t>\</a:t>
+            </a:r>
+          </a:p>
+          <a:p>
+            <a:pPr marL="514350" indent="-514350">
+              <a:buFont typeface="+mj-lt"/>
+              <a:buAutoNum type="arabicPeriod" startAt="7"/>
+            </a:pPr>
+            <a:r>
+              <a:rPr lang="nb-NO" dirty="0" err="1" smtClean="0"/>
+              <a:t>Creates</a:t>
+            </a:r>
+            <a:r>
+              <a:rPr lang="nb-NO" dirty="0" smtClean="0"/>
+              <a:t> an </a:t>
+            </a:r>
+            <a:r>
+              <a:rPr lang="nb-NO" dirty="0" err="1" smtClean="0"/>
+              <a:t>ordered</a:t>
+            </a:r>
+            <a:r>
+              <a:rPr lang="nb-NO" dirty="0" smtClean="0"/>
+              <a:t> list </a:t>
+            </a:r>
+            <a:r>
+              <a:rPr lang="nb-NO" dirty="0" err="1" smtClean="0"/>
+              <a:t>of</a:t>
+            </a:r>
+            <a:r>
+              <a:rPr lang="nb-NO" dirty="0" smtClean="0"/>
+              <a:t> </a:t>
+            </a:r>
+            <a:r>
+              <a:rPr lang="nb-NO" dirty="0" err="1" smtClean="0"/>
+              <a:t>dupfiles</a:t>
+            </a:r>
+            <a:r>
+              <a:rPr lang="nb-NO" dirty="0" smtClean="0"/>
+              <a:t> </a:t>
+            </a:r>
+            <a:r>
+              <a:rPr lang="nb-NO" dirty="0" err="1" smtClean="0"/>
+              <a:t>based</a:t>
+            </a:r>
+            <a:r>
+              <a:rPr lang="nb-NO" dirty="0" smtClean="0"/>
+              <a:t> </a:t>
+            </a:r>
+            <a:r>
+              <a:rPr lang="nb-NO" dirty="0" err="1" smtClean="0"/>
+              <a:t>on</a:t>
+            </a:r>
+            <a:r>
+              <a:rPr lang="nb-NO" dirty="0" smtClean="0"/>
+              <a:t> all </a:t>
+            </a:r>
+            <a:r>
+              <a:rPr lang="nb-NO" dirty="0" err="1" smtClean="0"/>
+              <a:t>dup-order.json</a:t>
+            </a:r>
+            <a:r>
+              <a:rPr lang="nb-NO" dirty="0" smtClean="0"/>
+              <a:t> files</a:t>
+            </a:r>
+          </a:p>
+          <a:p>
+            <a:pPr marL="514350" indent="-514350">
+              <a:buFont typeface="+mj-lt"/>
+              <a:buAutoNum type="arabicPeriod" startAt="7"/>
+            </a:pPr>
+            <a:r>
+              <a:rPr lang="nb-NO" dirty="0" smtClean="0"/>
+              <a:t>Queries the database to find if all these dupfiles must be executed</a:t>
+            </a:r>
+          </a:p>
+          <a:p>
+            <a:pPr marL="514350" indent="-514350">
+              <a:buFont typeface="+mj-lt"/>
+              <a:buAutoNum type="arabicPeriod" startAt="7"/>
+            </a:pPr>
+            <a:r>
+              <a:rPr lang="nb-NO" dirty="0" smtClean="0"/>
+              <a:t>Executes dup-files using dupconsole and runs dwdba after each dup to generate triggers and views</a:t>
+            </a:r>
+            <a:endParaRPr lang="nb-NO" dirty="0"/>
+          </a:p>
+          <a:p>
+            <a:pPr marL="514350" indent="-514350">
+              <a:buFont typeface="+mj-lt"/>
+              <a:buAutoNum type="arabicPeriod" startAt="7"/>
+            </a:pPr>
+            <a:endParaRPr lang="nb-NO" dirty="0" smtClean="0"/>
+          </a:p>
+        </p:txBody>
+      </p:sp>
+      <p:sp>
+        <p:nvSpPr>
+          <p:cNvPr id="2" name="Title 1"/>
+          <p:cNvSpPr>
+            <a:spLocks noGrp="1"/>
+          </p:cNvSpPr>
+          <p:nvPr>
+            <p:ph type="title"/>
+          </p:nvPr>
+        </p:nvSpPr>
+        <p:spPr/>
+        <p:txBody>
+          <a:bodyPr/>
+          <a:lstStyle/>
+          <a:p>
+            <a:r>
+              <a:rPr lang="nb-NO" dirty="0" err="1" smtClean="0"/>
+              <a:t>Install-DatabasePackages</a:t>
+            </a:r>
+            <a:r>
+              <a:rPr lang="nb-NO" dirty="0" smtClean="0"/>
+              <a:t> </a:t>
+            </a:r>
+            <a:r>
+              <a:rPr lang="nb-NO" dirty="0" err="1" smtClean="0"/>
+              <a:t>cont</a:t>
+            </a:r>
+            <a:r>
+              <a:rPr lang="nb-NO" dirty="0" smtClean="0"/>
+              <a:t>.</a:t>
+            </a:r>
+            <a:endParaRPr lang="nb-NO" dirty="0"/>
+          </a:p>
+        </p:txBody>
+      </p:sp>
+    </p:spTree>
+    <p:extLst>
+      <p:ext uri="{BB962C8B-B14F-4D97-AF65-F5344CB8AC3E}">
+        <p14:creationId xmlns:p14="http://schemas.microsoft.com/office/powerpoint/2010/main" val="2789536597"/>
+      </p:ext>
+    </p:extLst>
+  </p:cSld>
+  <p:clrMapOvr>
+    <a:masterClrMapping/>
+  </p:clrMapOvr>
+</p:sld>
+</file>
+
+<file path=ppt/slides/slide71.xml><?xml version="1.0" encoding="utf-8"?>
+<p:sld xmlns:a="http://schemas.openxmlformats.org/drawingml/2006/main" xmlns:r="http://schemas.openxmlformats.org/officeDocument/2006/relationships" xmlns:p="http://schemas.openxmlformats.org/presentationml/2006/main">
+  <p:cSld>
+    <p:spTree>
+      <p:nvGrpSpPr>
+        <p:cNvPr id="1" name=""/>
+        <p:cNvGrpSpPr/>
+        <p:nvPr/>
+      </p:nvGrpSpPr>
+      <p:grpSpPr>
+        <a:xfrm>
+          <a:off x="0" y="0"/>
+          <a:ext cx="0" cy="0"/>
+          <a:chOff x="0" y="0"/>
+          <a:chExt cx="0" cy="0"/>
+        </a:xfrm>
+      </p:grpSpPr>
+      <p:sp>
+        <p:nvSpPr>
+          <p:cNvPr id="3" name="Content Placeholder 2"/>
+          <p:cNvSpPr>
+            <a:spLocks noGrp="1"/>
+          </p:cNvSpPr>
+          <p:nvPr>
+            <p:ph idx="1"/>
+          </p:nvPr>
+        </p:nvSpPr>
+        <p:spPr/>
+        <p:txBody>
+          <a:bodyPr/>
+          <a:lstStyle/>
+          <a:p>
             <a:pPr marL="0" indent="0">
               <a:buNone/>
             </a:pPr>
@@ -19100,7 +19958,7 @@
 </p:sld>
 </file>
 
-<file path=ppt/slides/slide66.xml><?xml version="1.0" encoding="utf-8"?>
+<file path=ppt/slides/slide72.xml><?xml version="1.0" encoding="utf-8"?>
 <p:sld xmlns:a="http://schemas.openxmlformats.org/drawingml/2006/main" xmlns:r="http://schemas.openxmlformats.org/officeDocument/2006/relationships" xmlns:p="http://schemas.openxmlformats.org/presentationml/2006/main">
   <p:cSld>
     <p:spTree>
@@ -19480,7 +20338,7 @@
 </p:sld>
 </file>
 
-<file path=ppt/slides/slide67.xml><?xml version="1.0" encoding="utf-8"?>
+<file path=ppt/slides/slide73.xml><?xml version="1.0" encoding="utf-8"?>
 <p:sld xmlns:a="http://schemas.openxmlformats.org/drawingml/2006/main" xmlns:r="http://schemas.openxmlformats.org/officeDocument/2006/relationships" xmlns:p="http://schemas.openxmlformats.org/presentationml/2006/main">
   <p:cSld>
     <p:spTree>
@@ -19600,7 +20458,7 @@
 </p:sld>
 </file>
 
-<file path=ppt/slides/slide68.xml><?xml version="1.0" encoding="utf-8"?>
+<file path=ppt/slides/slide74.xml><?xml version="1.0" encoding="utf-8"?>
 <p:sld xmlns:a="http://schemas.openxmlformats.org/drawingml/2006/main" xmlns:r="http://schemas.openxmlformats.org/officeDocument/2006/relationships" xmlns:p="http://schemas.openxmlformats.org/presentationml/2006/main">
   <p:cSld>
     <p:spTree>
@@ -19759,7 +20617,7 @@
 </p:sld>
 </file>
 
-<file path=ppt/slides/slide69.xml><?xml version="1.0" encoding="utf-8"?>
+<file path=ppt/slides/slide75.xml><?xml version="1.0" encoding="utf-8"?>
 <p:sld xmlns:a="http://schemas.openxmlformats.org/drawingml/2006/main" xmlns:r="http://schemas.openxmlformats.org/officeDocument/2006/relationships" xmlns:p="http://schemas.openxmlformats.org/presentationml/2006/main">
   <p:cSld>
     <p:spTree>
@@ -20020,113 +20878,7 @@
 </p:sld>
 </file>
 
-<file path=ppt/slides/slide7.xml><?xml version="1.0" encoding="utf-8"?>
-<p:sld xmlns:a="http://schemas.openxmlformats.org/drawingml/2006/main" xmlns:r="http://schemas.openxmlformats.org/officeDocument/2006/relationships" xmlns:p="http://schemas.openxmlformats.org/presentationml/2006/main">
-  <p:cSld>
-    <p:spTree>
-      <p:nvGrpSpPr>
-        <p:cNvPr id="1" name=""/>
-        <p:cNvGrpSpPr/>
-        <p:nvPr/>
-      </p:nvGrpSpPr>
-      <p:grpSpPr>
-        <a:xfrm>
-          <a:off x="0" y="0"/>
-          <a:ext cx="0" cy="0"/>
-          <a:chOff x="0" y="0"/>
-          <a:chExt cx="0" cy="0"/>
-        </a:xfrm>
-      </p:grpSpPr>
-      <p:sp>
-        <p:nvSpPr>
-          <p:cNvPr id="3" name="Content Placeholder 2"/>
-          <p:cNvSpPr>
-            <a:spLocks noGrp="1"/>
-          </p:cNvSpPr>
-          <p:nvPr>
-            <p:ph idx="1"/>
-          </p:nvPr>
-        </p:nvSpPr>
-        <p:spPr/>
-        <p:txBody>
-          <a:bodyPr/>
-          <a:lstStyle/>
-          <a:p>
-            <a:endParaRPr lang="nb-NO" dirty="0" smtClean="0"/>
-          </a:p>
-          <a:p>
-            <a:endParaRPr lang="nb-NO" dirty="0"/>
-          </a:p>
-          <a:p>
-            <a:endParaRPr lang="nb-NO" dirty="0"/>
-          </a:p>
-        </p:txBody>
-      </p:sp>
-      <p:sp>
-        <p:nvSpPr>
-          <p:cNvPr id="2" name="Title 1"/>
-          <p:cNvSpPr>
-            <a:spLocks noGrp="1"/>
-          </p:cNvSpPr>
-          <p:nvPr>
-            <p:ph type="title"/>
-          </p:nvPr>
-        </p:nvSpPr>
-        <p:spPr/>
-        <p:txBody>
-          <a:bodyPr/>
-          <a:lstStyle/>
-          <a:p>
-            <a:r>
-              <a:rPr lang="nb-NO" dirty="0" smtClean="0"/>
-              <a:t>Manual IIS </a:t>
-            </a:r>
-            <a:r>
-              <a:rPr lang="nb-NO" dirty="0" err="1" smtClean="0"/>
-              <a:t>configuration</a:t>
-            </a:r>
-            <a:endParaRPr lang="nb-NO" dirty="0"/>
-          </a:p>
-        </p:txBody>
-      </p:sp>
-      <p:pic>
-        <p:nvPicPr>
-          <p:cNvPr id="4" name="Picture 3"/>
-          <p:cNvPicPr>
-            <a:picLocks noChangeAspect="1"/>
-          </p:cNvPicPr>
-          <p:nvPr/>
-        </p:nvPicPr>
-        <p:blipFill>
-          <a:blip r:embed="rId2"/>
-          <a:stretch>
-            <a:fillRect/>
-          </a:stretch>
-        </p:blipFill>
-        <p:spPr>
-          <a:xfrm>
-            <a:off x="2801562" y="2181398"/>
-            <a:ext cx="4743450" cy="4191000"/>
-          </a:xfrm>
-          <a:prstGeom prst="rect">
-            <a:avLst/>
-          </a:prstGeom>
-        </p:spPr>
-      </p:pic>
-    </p:spTree>
-    <p:extLst>
-      <p:ext uri="{BB962C8B-B14F-4D97-AF65-F5344CB8AC3E}">
-        <p14:creationId xmlns:p14="http://schemas.microsoft.com/office/powerpoint/2010/main" val="70904891"/>
-      </p:ext>
-    </p:extLst>
-  </p:cSld>
-  <p:clrMapOvr>
-    <a:masterClrMapping/>
-  </p:clrMapOvr>
-</p:sld>
-</file>
-
-<file path=ppt/slides/slide70.xml><?xml version="1.0" encoding="utf-8"?>
+<file path=ppt/slides/slide76.xml><?xml version="1.0" encoding="utf-8"?>
 <p:sld xmlns:a="http://schemas.openxmlformats.org/drawingml/2006/main" xmlns:r="http://schemas.openxmlformats.org/officeDocument/2006/relationships" xmlns:p="http://schemas.openxmlformats.org/presentationml/2006/main">
   <p:cSld>
     <p:spTree>
@@ -20739,7 +21491,7 @@
 </p:sld>
 </file>
 
-<file path=ppt/slides/slide71.xml><?xml version="1.0" encoding="utf-8"?>
+<file path=ppt/slides/slide77.xml><?xml version="1.0" encoding="utf-8"?>
 <p:sld xmlns:a="http://schemas.openxmlformats.org/drawingml/2006/main" xmlns:r="http://schemas.openxmlformats.org/officeDocument/2006/relationships" xmlns:p="http://schemas.openxmlformats.org/presentationml/2006/main">
   <p:cSld>
     <p:spTree>
@@ -20827,7 +21579,7 @@
 </p:sld>
 </file>
 
-<file path=ppt/slides/slide72.xml><?xml version="1.0" encoding="utf-8"?>
+<file path=ppt/slides/slide78.xml><?xml version="1.0" encoding="utf-8"?>
 <p:sld xmlns:a="http://schemas.openxmlformats.org/drawingml/2006/main" xmlns:r="http://schemas.openxmlformats.org/officeDocument/2006/relationships" xmlns:p="http://schemas.openxmlformats.org/presentationml/2006/main">
   <p:cSld>
     <p:spTree>

</xml_diff>